<commit_message>
スライドはss2012_slide.pptx もしくはss2012_slide.pdfを使用してください 	modified:   .gitignore 	deleted:    ss2012_slide.key 	new file:   ss2012_slide.pdf 	modified:   ss2012_slide.pptx 	new file:   ss2012_slide_meister.pptx
</commit_message>
<xml_diff>
--- a/ss2012_slide.pptx
+++ b/ss2012_slide.pptx
@@ -4,6 +4,9 @@
   <p:sldMasterIdLst>
     <p:sldMasterId id="2147483648" r:id="rId1"/>
   </p:sldMasterIdLst>
+  <p:notesMasterIdLst>
+    <p:notesMasterId r:id="rId30"/>
+  </p:notesMasterIdLst>
   <p:sldIdLst>
     <p:sldId id="256" r:id="rId2"/>
     <p:sldId id="271" r:id="rId3"/>
@@ -28,10 +31,11 @@
     <p:sldId id="274" r:id="rId22"/>
     <p:sldId id="262" r:id="rId23"/>
     <p:sldId id="266" r:id="rId24"/>
-    <p:sldId id="276" r:id="rId25"/>
-    <p:sldId id="268" r:id="rId26"/>
-    <p:sldId id="269" r:id="rId27"/>
-    <p:sldId id="277" r:id="rId28"/>
+    <p:sldId id="287" r:id="rId25"/>
+    <p:sldId id="276" r:id="rId26"/>
+    <p:sldId id="268" r:id="rId27"/>
+    <p:sldId id="269" r:id="rId28"/>
+    <p:sldId id="277" r:id="rId29"/>
   </p:sldIdLst>
   <p:sldSz cx="13004800" cy="9753600"/>
   <p:notesSz cx="6858000" cy="9144000"/>
@@ -170,6 +174,356 @@
     </a:lvl9pPr>
   </p:defaultTextStyle>
 </p:presentation>
+</file>
+
+<file path=ppt/notesMasters/notesMaster1.xml><?xml version="1.0" encoding="utf-8"?>
+<p:notesMaster xmlns:a="http://schemas.openxmlformats.org/drawingml/2006/main" xmlns:r="http://schemas.openxmlformats.org/officeDocument/2006/relationships" xmlns:p="http://schemas.openxmlformats.org/presentationml/2006/main">
+  <p:cSld>
+    <p:bg>
+      <p:bgRef idx="1001">
+        <a:schemeClr val="bg1"/>
+      </p:bgRef>
+    </p:bg>
+    <p:spTree>
+      <p:nvGrpSpPr>
+        <p:cNvPr id="1" name=""/>
+        <p:cNvGrpSpPr/>
+        <p:nvPr/>
+      </p:nvGrpSpPr>
+      <p:grpSpPr>
+        <a:xfrm>
+          <a:off x="0" y="0"/>
+          <a:ext cx="0" cy="0"/>
+          <a:chOff x="0" y="0"/>
+          <a:chExt cx="0" cy="0"/>
+        </a:xfrm>
+      </p:grpSpPr>
+      <p:sp>
+        <p:nvSpPr>
+          <p:cNvPr id="2" name="Header Placeholder 1"/>
+          <p:cNvSpPr>
+            <a:spLocks noGrp="1"/>
+          </p:cNvSpPr>
+          <p:nvPr>
+            <p:ph type="hdr" sz="quarter"/>
+          </p:nvPr>
+        </p:nvSpPr>
+        <p:spPr>
+          <a:xfrm>
+            <a:off x="0" y="0"/>
+            <a:ext cx="2971800" cy="457200"/>
+          </a:xfrm>
+          <a:prstGeom prst="rect">
+            <a:avLst/>
+          </a:prstGeom>
+        </p:spPr>
+        <p:txBody>
+          <a:bodyPr vert="horz" lIns="91440" tIns="45720" rIns="91440" bIns="45720" rtlCol="0"/>
+          <a:lstStyle>
+            <a:lvl1pPr algn="l">
+              <a:defRPr sz="1200"/>
+            </a:lvl1pPr>
+          </a:lstStyle>
+          <a:p>
+            <a:endParaRPr kumimoji="1" lang="ja-JP" altLang="en-US"/>
+          </a:p>
+        </p:txBody>
+      </p:sp>
+      <p:sp>
+        <p:nvSpPr>
+          <p:cNvPr id="3" name="Date Placeholder 2"/>
+          <p:cNvSpPr>
+            <a:spLocks noGrp="1"/>
+          </p:cNvSpPr>
+          <p:nvPr>
+            <p:ph type="dt" idx="1"/>
+          </p:nvPr>
+        </p:nvSpPr>
+        <p:spPr>
+          <a:xfrm>
+            <a:off x="3884613" y="0"/>
+            <a:ext cx="2971800" cy="457200"/>
+          </a:xfrm>
+          <a:prstGeom prst="rect">
+            <a:avLst/>
+          </a:prstGeom>
+        </p:spPr>
+        <p:txBody>
+          <a:bodyPr vert="horz" lIns="91440" tIns="45720" rIns="91440" bIns="45720" rtlCol="0"/>
+          <a:lstStyle>
+            <a:lvl1pPr algn="r">
+              <a:defRPr sz="1200"/>
+            </a:lvl1pPr>
+          </a:lstStyle>
+          <a:p>
+            <a:fld id="{2871D328-B0BD-4169-8843-6C8D9ECD8AE3}" type="datetimeFigureOut">
+              <a:rPr kumimoji="1" lang="ja-JP" altLang="en-US" smtClean="0"/>
+              <a:t>2012/3/8</a:t>
+            </a:fld>
+            <a:endParaRPr kumimoji="1" lang="ja-JP" altLang="en-US"/>
+          </a:p>
+        </p:txBody>
+      </p:sp>
+      <p:sp>
+        <p:nvSpPr>
+          <p:cNvPr id="4" name="Slide Image Placeholder 3"/>
+          <p:cNvSpPr>
+            <a:spLocks noGrp="1" noRot="1" noChangeAspect="1"/>
+          </p:cNvSpPr>
+          <p:nvPr>
+            <p:ph type="sldImg" idx="2"/>
+          </p:nvPr>
+        </p:nvSpPr>
+        <p:spPr>
+          <a:xfrm>
+            <a:off x="1143000" y="685800"/>
+            <a:ext cx="4572000" cy="3429000"/>
+          </a:xfrm>
+          <a:prstGeom prst="rect">
+            <a:avLst/>
+          </a:prstGeom>
+          <a:noFill/>
+          <a:ln w="12700">
+            <a:solidFill>
+              <a:prstClr val="black"/>
+            </a:solidFill>
+          </a:ln>
+        </p:spPr>
+        <p:txBody>
+          <a:bodyPr vert="horz" lIns="91440" tIns="45720" rIns="91440" bIns="45720" rtlCol="0" anchor="ctr"/>
+          <a:lstStyle/>
+          <a:p>
+            <a:endParaRPr lang="ja-JP" altLang="en-US"/>
+          </a:p>
+        </p:txBody>
+      </p:sp>
+      <p:sp>
+        <p:nvSpPr>
+          <p:cNvPr id="5" name="Notes Placeholder 4"/>
+          <p:cNvSpPr>
+            <a:spLocks noGrp="1"/>
+          </p:cNvSpPr>
+          <p:nvPr>
+            <p:ph type="body" sz="quarter" idx="3"/>
+          </p:nvPr>
+        </p:nvSpPr>
+        <p:spPr>
+          <a:xfrm>
+            <a:off x="685800" y="4343400"/>
+            <a:ext cx="5486400" cy="4114800"/>
+          </a:xfrm>
+          <a:prstGeom prst="rect">
+            <a:avLst/>
+          </a:prstGeom>
+        </p:spPr>
+        <p:txBody>
+          <a:bodyPr vert="horz" lIns="91440" tIns="45720" rIns="91440" bIns="45720" rtlCol="0"/>
+          <a:lstStyle/>
+          <a:p>
+            <a:pPr lvl="0"/>
+            <a:r>
+              <a:rPr kumimoji="1" lang="en-US" altLang="ja-JP" smtClean="0"/>
+              <a:t>Click to edit Master text styles</a:t>
+            </a:r>
+          </a:p>
+          <a:p>
+            <a:pPr lvl="1"/>
+            <a:r>
+              <a:rPr kumimoji="1" lang="en-US" altLang="ja-JP" smtClean="0"/>
+              <a:t>Second level</a:t>
+            </a:r>
+          </a:p>
+          <a:p>
+            <a:pPr lvl="2"/>
+            <a:r>
+              <a:rPr kumimoji="1" lang="en-US" altLang="ja-JP" smtClean="0"/>
+              <a:t>Third level</a:t>
+            </a:r>
+          </a:p>
+          <a:p>
+            <a:pPr lvl="3"/>
+            <a:r>
+              <a:rPr kumimoji="1" lang="en-US" altLang="ja-JP" smtClean="0"/>
+              <a:t>Fourth level</a:t>
+            </a:r>
+          </a:p>
+          <a:p>
+            <a:pPr lvl="4"/>
+            <a:r>
+              <a:rPr kumimoji="1" lang="en-US" altLang="ja-JP" smtClean="0"/>
+              <a:t>Fifth level</a:t>
+            </a:r>
+            <a:endParaRPr kumimoji="1" lang="ja-JP" altLang="en-US"/>
+          </a:p>
+        </p:txBody>
+      </p:sp>
+      <p:sp>
+        <p:nvSpPr>
+          <p:cNvPr id="6" name="Footer Placeholder 5"/>
+          <p:cNvSpPr>
+            <a:spLocks noGrp="1"/>
+          </p:cNvSpPr>
+          <p:nvPr>
+            <p:ph type="ftr" sz="quarter" idx="4"/>
+          </p:nvPr>
+        </p:nvSpPr>
+        <p:spPr>
+          <a:xfrm>
+            <a:off x="0" y="8685213"/>
+            <a:ext cx="2971800" cy="457200"/>
+          </a:xfrm>
+          <a:prstGeom prst="rect">
+            <a:avLst/>
+          </a:prstGeom>
+        </p:spPr>
+        <p:txBody>
+          <a:bodyPr vert="horz" lIns="91440" tIns="45720" rIns="91440" bIns="45720" rtlCol="0" anchor="b"/>
+          <a:lstStyle>
+            <a:lvl1pPr algn="l">
+              <a:defRPr sz="1200"/>
+            </a:lvl1pPr>
+          </a:lstStyle>
+          <a:p>
+            <a:endParaRPr kumimoji="1" lang="ja-JP" altLang="en-US"/>
+          </a:p>
+        </p:txBody>
+      </p:sp>
+      <p:sp>
+        <p:nvSpPr>
+          <p:cNvPr id="7" name="Slide Number Placeholder 6"/>
+          <p:cNvSpPr>
+            <a:spLocks noGrp="1"/>
+          </p:cNvSpPr>
+          <p:nvPr>
+            <p:ph type="sldNum" sz="quarter" idx="5"/>
+          </p:nvPr>
+        </p:nvSpPr>
+        <p:spPr>
+          <a:xfrm>
+            <a:off x="3884613" y="8685213"/>
+            <a:ext cx="2971800" cy="457200"/>
+          </a:xfrm>
+          <a:prstGeom prst="rect">
+            <a:avLst/>
+          </a:prstGeom>
+        </p:spPr>
+        <p:txBody>
+          <a:bodyPr vert="horz" lIns="91440" tIns="45720" rIns="91440" bIns="45720" rtlCol="0" anchor="b"/>
+          <a:lstStyle>
+            <a:lvl1pPr algn="r">
+              <a:defRPr sz="1200"/>
+            </a:lvl1pPr>
+          </a:lstStyle>
+          <a:p>
+            <a:fld id="{ABBD0019-26BD-46ED-A8C4-732A3BEB6EDE}" type="slidenum">
+              <a:rPr kumimoji="1" lang="ja-JP" altLang="en-US" smtClean="0"/>
+              <a:t>‹#›</a:t>
+            </a:fld>
+            <a:endParaRPr kumimoji="1" lang="ja-JP" altLang="en-US"/>
+          </a:p>
+        </p:txBody>
+      </p:sp>
+    </p:spTree>
+    <p:extLst>
+      <p:ext uri="{BB962C8B-B14F-4D97-AF65-F5344CB8AC3E}">
+        <p14:creationId xmlns:p14="http://schemas.microsoft.com/office/powerpoint/2010/main" val="861338957"/>
+      </p:ext>
+    </p:extLst>
+  </p:cSld>
+  <p:clrMap bg1="lt1" tx1="dk1" bg2="lt2" tx2="dk2" accent1="accent1" accent2="accent2" accent3="accent3" accent4="accent4" accent5="accent5" accent6="accent6" hlink="hlink" folHlink="folHlink"/>
+  <p:notesStyle>
+    <a:lvl1pPr marL="0" algn="l" defTabSz="914400" rtl="0" eaLnBrk="1" latinLnBrk="0" hangingPunct="1">
+      <a:defRPr kumimoji="1" sz="1200" kern="1200">
+        <a:solidFill>
+          <a:schemeClr val="tx1"/>
+        </a:solidFill>
+        <a:latin typeface="+mn-lt"/>
+        <a:ea typeface="+mn-ea"/>
+        <a:cs typeface="+mn-cs"/>
+      </a:defRPr>
+    </a:lvl1pPr>
+    <a:lvl2pPr marL="457200" algn="l" defTabSz="914400" rtl="0" eaLnBrk="1" latinLnBrk="0" hangingPunct="1">
+      <a:defRPr kumimoji="1" sz="1200" kern="1200">
+        <a:solidFill>
+          <a:schemeClr val="tx1"/>
+        </a:solidFill>
+        <a:latin typeface="+mn-lt"/>
+        <a:ea typeface="+mn-ea"/>
+        <a:cs typeface="+mn-cs"/>
+      </a:defRPr>
+    </a:lvl2pPr>
+    <a:lvl3pPr marL="914400" algn="l" defTabSz="914400" rtl="0" eaLnBrk="1" latinLnBrk="0" hangingPunct="1">
+      <a:defRPr kumimoji="1" sz="1200" kern="1200">
+        <a:solidFill>
+          <a:schemeClr val="tx1"/>
+        </a:solidFill>
+        <a:latin typeface="+mn-lt"/>
+        <a:ea typeface="+mn-ea"/>
+        <a:cs typeface="+mn-cs"/>
+      </a:defRPr>
+    </a:lvl3pPr>
+    <a:lvl4pPr marL="1371600" algn="l" defTabSz="914400" rtl="0" eaLnBrk="1" latinLnBrk="0" hangingPunct="1">
+      <a:defRPr kumimoji="1" sz="1200" kern="1200">
+        <a:solidFill>
+          <a:schemeClr val="tx1"/>
+        </a:solidFill>
+        <a:latin typeface="+mn-lt"/>
+        <a:ea typeface="+mn-ea"/>
+        <a:cs typeface="+mn-cs"/>
+      </a:defRPr>
+    </a:lvl4pPr>
+    <a:lvl5pPr marL="1828800" algn="l" defTabSz="914400" rtl="0" eaLnBrk="1" latinLnBrk="0" hangingPunct="1">
+      <a:defRPr kumimoji="1" sz="1200" kern="1200">
+        <a:solidFill>
+          <a:schemeClr val="tx1"/>
+        </a:solidFill>
+        <a:latin typeface="+mn-lt"/>
+        <a:ea typeface="+mn-ea"/>
+        <a:cs typeface="+mn-cs"/>
+      </a:defRPr>
+    </a:lvl5pPr>
+    <a:lvl6pPr marL="2286000" algn="l" defTabSz="914400" rtl="0" eaLnBrk="1" latinLnBrk="0" hangingPunct="1">
+      <a:defRPr kumimoji="1" sz="1200" kern="1200">
+        <a:solidFill>
+          <a:schemeClr val="tx1"/>
+        </a:solidFill>
+        <a:latin typeface="+mn-lt"/>
+        <a:ea typeface="+mn-ea"/>
+        <a:cs typeface="+mn-cs"/>
+      </a:defRPr>
+    </a:lvl6pPr>
+    <a:lvl7pPr marL="2743200" algn="l" defTabSz="914400" rtl="0" eaLnBrk="1" latinLnBrk="0" hangingPunct="1">
+      <a:defRPr kumimoji="1" sz="1200" kern="1200">
+        <a:solidFill>
+          <a:schemeClr val="tx1"/>
+        </a:solidFill>
+        <a:latin typeface="+mn-lt"/>
+        <a:ea typeface="+mn-ea"/>
+        <a:cs typeface="+mn-cs"/>
+      </a:defRPr>
+    </a:lvl7pPr>
+    <a:lvl8pPr marL="3200400" algn="l" defTabSz="914400" rtl="0" eaLnBrk="1" latinLnBrk="0" hangingPunct="1">
+      <a:defRPr kumimoji="1" sz="1200" kern="1200">
+        <a:solidFill>
+          <a:schemeClr val="tx1"/>
+        </a:solidFill>
+        <a:latin typeface="+mn-lt"/>
+        <a:ea typeface="+mn-ea"/>
+        <a:cs typeface="+mn-cs"/>
+      </a:defRPr>
+    </a:lvl8pPr>
+    <a:lvl9pPr marL="3657600" algn="l" defTabSz="914400" rtl="0" eaLnBrk="1" latinLnBrk="0" hangingPunct="1">
+      <a:defRPr kumimoji="1" sz="1200" kern="1200">
+        <a:solidFill>
+          <a:schemeClr val="tx1"/>
+        </a:solidFill>
+        <a:latin typeface="+mn-lt"/>
+        <a:ea typeface="+mn-ea"/>
+        <a:cs typeface="+mn-cs"/>
+      </a:defRPr>
+    </a:lvl9pPr>
+  </p:notesStyle>
+</p:notesMaster>
 </file>
 
 <file path=ppt/slideLayouts/slideLayout1.xml><?xml version="1.0" encoding="utf-8"?>
@@ -2338,7 +2692,7 @@
 </file>
 
 <file path=ppt/slides/slide11.xml><?xml version="1.0" encoding="utf-8"?>
-<p:sld xmlns:a="http://schemas.openxmlformats.org/drawingml/2006/main" xmlns:r="http://schemas.openxmlformats.org/officeDocument/2006/relationships" xmlns:p="http://schemas.openxmlformats.org/presentationml/2006/main">
+<p:sld xmlns:a="http://schemas.openxmlformats.org/drawingml/2006/main" xmlns:r="http://schemas.openxmlformats.org/officeDocument/2006/relationships" xmlns:p="http://schemas.openxmlformats.org/presentationml/2006/main" show="0">
   <p:cSld>
     <p:spTree>
       <p:nvGrpSpPr>
@@ -2512,7 +2866,11 @@
             </a:r>
             <a:r>
               <a:rPr kumimoji="1" lang="ja-JP" altLang="en-US" dirty="0" smtClean="0"/>
-              <a:t>されたことを聞く度に、この仕事をしていてよかったと感じるんです。」</a:t>
+              <a:t>されたことを聞く度に、この仕事をしていてよかったと感じるんです。</a:t>
+            </a:r>
+            <a:r>
+              <a:rPr kumimoji="1" lang="ja-JP" altLang="en-US" dirty="0" smtClean="0"/>
+              <a:t>」</a:t>
             </a:r>
             <a:endParaRPr kumimoji="1" lang="en-US" altLang="ja-JP" dirty="0" smtClean="0"/>
           </a:p>
@@ -2788,11 +3146,7 @@
             </a:r>
             <a:r>
               <a:rPr lang="ja-JP" altLang="en-US" dirty="0" smtClean="0"/>
-              <a:t>が入って</a:t>
-            </a:r>
-            <a:r>
-              <a:rPr lang="ja-JP" altLang="en-US" dirty="0" smtClean="0"/>
-              <a:t>いる</a:t>
+              <a:t>が入っている</a:t>
             </a:r>
             <a:r>
               <a:rPr lang="en-US" altLang="ja-JP" dirty="0" smtClean="0"/>
@@ -3256,7 +3610,11 @@
           <a:p>
             <a:r>
               <a:rPr lang="ja-JP" altLang="en-US" dirty="0" smtClean="0"/>
-              <a:t>最大エントロピー法</a:t>
+              <a:t>最大</a:t>
+            </a:r>
+            <a:r>
+              <a:rPr lang="ja-JP" altLang="en-US" dirty="0" smtClean="0"/>
+              <a:t>エントロピー法：概略</a:t>
             </a:r>
             <a:endParaRPr lang="ja-JP" altLang="en-US" dirty="0"/>
           </a:p>
@@ -3482,67 +3840,97 @@
               <a:rPr lang="en-US" altLang="ja-JP" dirty="0" smtClean="0"/>
               <a:t>) = 0.5</a:t>
             </a:r>
-            <a:endParaRPr lang="en-US" altLang="ja-JP" dirty="0" smtClean="0"/>
           </a:p>
         </p:txBody>
       </p:sp>
-      <p:graphicFrame>
-        <p:nvGraphicFramePr>
-          <p:cNvPr id="4" name="オブジェクト 3"/>
-          <p:cNvGraphicFramePr>
-            <a:graphicFrameLocks noChangeAspect="1"/>
-          </p:cNvGraphicFramePr>
+      <p:sp>
+        <p:nvSpPr>
+          <p:cNvPr id="5" name="Slide Number Placeholder 4"/>
+          <p:cNvSpPr>
+            <a:spLocks noGrp="1"/>
+          </p:cNvSpPr>
           <p:nvPr>
-            <p:extLst>
-              <p:ext uri="{D42A27DB-BD31-4B8C-83A1-F6EECF244321}">
-                <p14:modId xmlns:p14="http://schemas.microsoft.com/office/powerpoint/2010/main" val="2026422504"/>
-              </p:ext>
-            </p:extLst>
+            <p:ph type="sldNum" sz="quarter" idx="4"/>
           </p:nvPr>
-        </p:nvGraphicFramePr>
-        <p:xfrm>
-          <a:off x="1965896" y="3076600"/>
-          <a:ext cx="3359546" cy="792088"/>
-        </p:xfrm>
-        <a:graphic>
-          <a:graphicData uri="http://schemas.openxmlformats.org/presentationml/2006/ole">
-            <mc:AlternateContent xmlns:mc="http://schemas.openxmlformats.org/markup-compatibility/2006">
-              <mc:Choice xmlns:v="urn:schemas-microsoft-com:vml" Requires="v">
-                <p:oleObj spid="_x0000_s1032" name="数式" r:id="rId3" imgW="1562100" imgH="368300" progId="Equation.3">
-                  <p:embed/>
-                </p:oleObj>
-              </mc:Choice>
-              <mc:Fallback>
-                <p:oleObj name="数式" r:id="rId3" imgW="1562100" imgH="368300" progId="Equation.3">
-                  <p:embed/>
-                  <p:pic>
-                    <p:nvPicPr>
-                      <p:cNvPr id="0" name=""/>
-                      <p:cNvPicPr/>
-                      <p:nvPr/>
-                    </p:nvPicPr>
-                    <p:blipFill>
-                      <a:blip r:embed="rId4"/>
-                      <a:stretch>
-                        <a:fillRect/>
-                      </a:stretch>
-                    </p:blipFill>
-                    <p:spPr>
-                      <a:xfrm>
-                        <a:off x="1965896" y="3076600"/>
-                        <a:ext cx="3359546" cy="792088"/>
-                      </a:xfrm>
-                      <a:prstGeom prst="rect">
-                        <a:avLst/>
-                      </a:prstGeom>
-                    </p:spPr>
-                  </p:pic>
-                </p:oleObj>
-              </mc:Fallback>
-            </mc:AlternateContent>
-          </a:graphicData>
-        </a:graphic>
-      </p:graphicFrame>
+        </p:nvSpPr>
+        <p:spPr/>
+        <p:txBody>
+          <a:bodyPr/>
+          <a:lstStyle/>
+          <a:p>
+            <a:fld id="{6E9D2D78-C182-4C73-A5DD-18ECD1D1B49E}" type="slidenum">
+              <a:rPr lang="en-US" altLang="ja-JP" smtClean="0"/>
+              <a:pPr/>
+              <a:t>15</a:t>
+            </a:fld>
+            <a:endParaRPr lang="en-US" altLang="ja-JP" dirty="0"/>
+          </a:p>
+        </p:txBody>
+      </p:sp>
+      <p:pic>
+        <p:nvPicPr>
+          <p:cNvPr id="1044" name="Picture 20"/>
+          <p:cNvPicPr>
+            <a:picLocks noChangeAspect="1" noChangeArrowheads="1"/>
+          </p:cNvPicPr>
+          <p:nvPr/>
+        </p:nvPicPr>
+        <p:blipFill>
+          <a:blip r:embed="rId2">
+            <a:extLst>
+              <a:ext uri="{28A0092B-C50C-407E-A947-70E740481C1C}">
+                <a14:useLocalDpi xmlns:a14="http://schemas.microsoft.com/office/drawing/2010/main" val="0"/>
+              </a:ext>
+            </a:extLst>
+          </a:blip>
+          <a:srcRect/>
+          <a:stretch>
+            <a:fillRect/>
+          </a:stretch>
+        </p:blipFill>
+        <p:spPr bwMode="auto">
+          <a:xfrm>
+            <a:off x="4774208" y="2894923"/>
+            <a:ext cx="3371850" cy="800100"/>
+          </a:xfrm>
+          <a:prstGeom prst="rect">
+            <a:avLst/>
+          </a:prstGeom>
+          <a:noFill/>
+          <a:ln>
+            <a:noFill/>
+          </a:ln>
+          <a:effectLst/>
+          <a:extLst>
+            <a:ext uri="{909E8E84-426E-40DD-AFC4-6F175D3DCCD1}">
+              <a14:hiddenFill xmlns:a14="http://schemas.microsoft.com/office/drawing/2010/main">
+                <a:solidFill>
+                  <a:schemeClr val="accent1"/>
+                </a:solidFill>
+              </a14:hiddenFill>
+            </a:ext>
+            <a:ext uri="{91240B29-F687-4F45-9708-019B960494DF}">
+              <a14:hiddenLine xmlns:a14="http://schemas.microsoft.com/office/drawing/2010/main" w="9525">
+                <a:solidFill>
+                  <a:schemeClr val="tx1"/>
+                </a:solidFill>
+                <a:miter lim="800000"/>
+                <a:headEnd/>
+                <a:tailEnd/>
+              </a14:hiddenLine>
+            </a:ext>
+            <a:ext uri="{AF507438-7753-43E0-B8FC-AC1667EBCBE1}">
+              <a14:hiddenEffects xmlns:a14="http://schemas.microsoft.com/office/drawing/2010/main">
+                <a:effectLst>
+                  <a:outerShdw dist="35921" dir="2700000" algn="ctr" rotWithShape="0">
+                    <a:schemeClr val="bg2"/>
+                  </a:outerShdw>
+                </a:effectLst>
+              </a14:hiddenEffects>
+            </a:ext>
+          </a:extLst>
+        </p:spPr>
+      </p:pic>
     </p:spTree>
     <p:extLst>
       <p:ext uri="{BB962C8B-B14F-4D97-AF65-F5344CB8AC3E}">
@@ -3598,7 +3986,11 @@
           <a:p>
             <a:r>
               <a:rPr kumimoji="1" lang="ja-JP" altLang="en-US" dirty="0" smtClean="0"/>
-              <a:t>最大エントロピー法</a:t>
+              <a:t>最大</a:t>
+            </a:r>
+            <a:r>
+              <a:rPr kumimoji="1" lang="ja-JP" altLang="en-US" dirty="0" smtClean="0"/>
+              <a:t>エントロピー法：例題</a:t>
             </a:r>
             <a:endParaRPr kumimoji="1" lang="ja-JP" altLang="en-US" dirty="0"/>
           </a:p>
@@ -3791,6 +4183,30 @@
           </a:p>
           <a:p>
             <a:endParaRPr kumimoji="1" lang="en-US" altLang="ja-JP" dirty="0" smtClean="0"/>
+          </a:p>
+        </p:txBody>
+      </p:sp>
+      <p:sp>
+        <p:nvSpPr>
+          <p:cNvPr id="4" name="Slide Number Placeholder 3"/>
+          <p:cNvSpPr>
+            <a:spLocks noGrp="1"/>
+          </p:cNvSpPr>
+          <p:nvPr>
+            <p:ph type="sldNum" sz="quarter" idx="4"/>
+          </p:nvPr>
+        </p:nvSpPr>
+        <p:spPr/>
+        <p:txBody>
+          <a:bodyPr/>
+          <a:lstStyle/>
+          <a:p>
+            <a:fld id="{6E9D2D78-C182-4C73-A5DD-18ECD1D1B49E}" type="slidenum">
+              <a:rPr lang="en-US" altLang="ja-JP" smtClean="0"/>
+              <a:pPr/>
+              <a:t>16</a:t>
+            </a:fld>
+            <a:endParaRPr lang="en-US" altLang="ja-JP" dirty="0"/>
           </a:p>
         </p:txBody>
       </p:sp>
@@ -3849,7 +4265,11 @@
           <a:p>
             <a:r>
               <a:rPr kumimoji="1" lang="ja-JP" altLang="en-US" dirty="0" smtClean="0"/>
-              <a:t>最大エントロピー法</a:t>
+              <a:t>最大</a:t>
+            </a:r>
+            <a:r>
+              <a:rPr kumimoji="1" lang="ja-JP" altLang="en-US" dirty="0" smtClean="0"/>
+              <a:t>エントロピー法：例題</a:t>
             </a:r>
             <a:endParaRPr kumimoji="1" lang="ja-JP" altLang="en-US" dirty="0"/>
           </a:p>
@@ -3967,11 +4387,7 @@
             </a:r>
             <a:r>
               <a:rPr kumimoji="1" lang="ja-JP" altLang="en-US" dirty="0" smtClean="0"/>
-              <a:t>単語目に</a:t>
-            </a:r>
-            <a:r>
-              <a:rPr kumimoji="1" lang="ja-JP" altLang="en-US" dirty="0" smtClean="0"/>
-              <a:t>出現</a:t>
+              <a:t>単語目に出現</a:t>
             </a:r>
             <a:r>
               <a:rPr kumimoji="1" lang="en-US" altLang="ja-JP" dirty="0" smtClean="0"/>
@@ -4403,6 +4819,30 @@
           </a:p>
           <a:p>
             <a:endParaRPr kumimoji="1" lang="ja-JP" altLang="en-US" dirty="0"/>
+          </a:p>
+        </p:txBody>
+      </p:sp>
+      <p:sp>
+        <p:nvSpPr>
+          <p:cNvPr id="4" name="Slide Number Placeholder 3"/>
+          <p:cNvSpPr>
+            <a:spLocks noGrp="1"/>
+          </p:cNvSpPr>
+          <p:nvPr>
+            <p:ph type="sldNum" sz="quarter" idx="4"/>
+          </p:nvPr>
+        </p:nvSpPr>
+        <p:spPr/>
+        <p:txBody>
+          <a:bodyPr/>
+          <a:lstStyle/>
+          <a:p>
+            <a:fld id="{6E9D2D78-C182-4C73-A5DD-18ECD1D1B49E}" type="slidenum">
+              <a:rPr lang="en-US" altLang="ja-JP" smtClean="0"/>
+              <a:pPr/>
+              <a:t>17</a:t>
+            </a:fld>
+            <a:endParaRPr lang="en-US" altLang="ja-JP" dirty="0"/>
           </a:p>
         </p:txBody>
       </p:sp>
@@ -4461,7 +4901,11 @@
           <a:p>
             <a:r>
               <a:rPr kumimoji="1" lang="ja-JP" altLang="en-US" dirty="0" smtClean="0"/>
-              <a:t>最大エントロピー法</a:t>
+              <a:t>最大</a:t>
+            </a:r>
+            <a:r>
+              <a:rPr kumimoji="1" lang="ja-JP" altLang="en-US" dirty="0" smtClean="0"/>
+              <a:t>エントロピー法：分類・まとめ</a:t>
             </a:r>
             <a:endParaRPr kumimoji="1" lang="ja-JP" altLang="en-US" dirty="0"/>
           </a:p>
@@ -4477,15 +4921,10 @@
             <p:ph sz="quarter" idx="10"/>
           </p:nvPr>
         </p:nvSpPr>
-        <p:spPr>
-          <a:xfrm>
-            <a:off x="525736" y="2355850"/>
-            <a:ext cx="12313368" cy="7201470"/>
-          </a:xfrm>
-        </p:spPr>
+        <p:spPr/>
         <p:txBody>
           <a:bodyPr>
-            <a:normAutofit fontScale="92500" lnSpcReduction="20000"/>
+            <a:normAutofit fontScale="85000" lnSpcReduction="20000"/>
           </a:bodyPr>
           <a:lstStyle/>
           <a:p>
@@ -4761,6 +5200,30 @@
           </a:prstGeom>
         </p:spPr>
       </p:pic>
+      <p:sp>
+        <p:nvSpPr>
+          <p:cNvPr id="4" name="Slide Number Placeholder 3"/>
+          <p:cNvSpPr>
+            <a:spLocks noGrp="1"/>
+          </p:cNvSpPr>
+          <p:nvPr>
+            <p:ph type="sldNum" sz="quarter" idx="4"/>
+          </p:nvPr>
+        </p:nvSpPr>
+        <p:spPr/>
+        <p:txBody>
+          <a:bodyPr/>
+          <a:lstStyle/>
+          <a:p>
+            <a:fld id="{6E9D2D78-C182-4C73-A5DD-18ECD1D1B49E}" type="slidenum">
+              <a:rPr lang="en-US" altLang="ja-JP" smtClean="0"/>
+              <a:pPr/>
+              <a:t>18</a:t>
+            </a:fld>
+            <a:endParaRPr lang="en-US" altLang="ja-JP" dirty="0"/>
+          </a:p>
+        </p:txBody>
+      </p:sp>
     </p:spTree>
     <p:extLst>
       <p:ext uri="{BB962C8B-B14F-4D97-AF65-F5344CB8AC3E}">
@@ -5239,12 +5702,16 @@
           <a:lstStyle/>
           <a:p>
             <a:r>
-              <a:rPr lang="en-US" altLang="ja-JP" dirty="0" err="1"/>
-              <a:t>nltk.classify</a:t>
+              <a:rPr lang="en-US" altLang="ja-JP" dirty="0" err="1" smtClean="0"/>
+              <a:t>nltk.MaxentClassifier</a:t>
+            </a:r>
+            <a:r>
+              <a:rPr lang="ja-JP" altLang="en-US" dirty="0" smtClean="0"/>
+              <a:t>の</a:t>
             </a:r>
             <a:r>
               <a:rPr lang="ja-JP" altLang="en-US" dirty="0"/>
-              <a:t>のための学習事例</a:t>
+              <a:t>ための学習事例</a:t>
             </a:r>
           </a:p>
         </p:txBody>
@@ -6272,6 +6739,162 @@
           </a:p>
         </p:txBody>
       </p:sp>
+      <p:sp>
+        <p:nvSpPr>
+          <p:cNvPr id="2" name="TextBox 1"/>
+          <p:cNvSpPr txBox="1"/>
+          <p:nvPr/>
+        </p:nvSpPr>
+        <p:spPr>
+          <a:xfrm>
+            <a:off x="5926336" y="4084712"/>
+            <a:ext cx="6665460" cy="2044149"/>
+          </a:xfrm>
+          <a:prstGeom prst="rect">
+            <a:avLst/>
+          </a:prstGeom>
+          <a:effectLst>
+            <a:outerShdw blurRad="40000" dist="23000" dir="5400000" rotWithShape="0">
+              <a:srgbClr val="000000">
+                <a:alpha val="35000"/>
+              </a:srgbClr>
+            </a:outerShdw>
+            <a:softEdge rad="63500"/>
+          </a:effectLst>
+        </p:spPr>
+        <p:style>
+          <a:lnRef idx="1">
+            <a:schemeClr val="accent3"/>
+          </a:lnRef>
+          <a:fillRef idx="3">
+            <a:schemeClr val="accent3"/>
+          </a:fillRef>
+          <a:effectRef idx="2">
+            <a:schemeClr val="accent3"/>
+          </a:effectRef>
+          <a:fontRef idx="minor">
+            <a:schemeClr val="lt1"/>
+          </a:fontRef>
+        </p:style>
+        <p:txBody>
+          <a:bodyPr wrap="square" rtlCol="0">
+            <a:spAutoFit/>
+          </a:bodyPr>
+          <a:lstStyle/>
+          <a:p>
+            <a:pPr marL="525463" lvl="2" algn="l">
+              <a:spcBef>
+                <a:spcPts val="1900"/>
+              </a:spcBef>
+              <a:spcAft>
+                <a:spcPts val="1800"/>
+              </a:spcAft>
+              <a:buClr>
+                <a:srgbClr val="6585CF">
+                  <a:lumMod val="75000"/>
+                </a:srgbClr>
+              </a:buClr>
+              <a:tabLst>
+                <a:tab pos="1304925" algn="l"/>
+                <a:tab pos="2346325" algn="l"/>
+                <a:tab pos="1304925" algn="l"/>
+                <a:tab pos="2346325" algn="l"/>
+              </a:tabLst>
+            </a:pPr>
+            <a:r>
+              <a:rPr lang="en-US" altLang="ja-JP" sz="2400" dirty="0">
+                <a:latin typeface="Consolas" pitchFamily="49" charset="0"/>
+                <a:cs typeface="Consolas" pitchFamily="49" charset="0"/>
+                <a:sym typeface="Helvetica" charset="0"/>
+              </a:rPr>
+              <a:t>words = [“The”, “cat”, “is”, …]</a:t>
+            </a:r>
+            <a:r>
+              <a:rPr lang="en-US" altLang="ja-JP" sz="2400" dirty="0">
+                <a:latin typeface="Consolas" pitchFamily="49" charset="0"/>
+                <a:cs typeface="Consolas" pitchFamily="49" charset="0"/>
+                <a:sym typeface="Helvetica" charset="0"/>
+              </a:rPr>
+              <a:t/>
+            </a:r>
+            <a:br>
+              <a:rPr lang="en-US" altLang="ja-JP" sz="2400" dirty="0">
+                <a:latin typeface="Consolas" pitchFamily="49" charset="0"/>
+                <a:cs typeface="Consolas" pitchFamily="49" charset="0"/>
+                <a:sym typeface="Helvetica" charset="0"/>
+              </a:rPr>
+            </a:br>
+            <a:r>
+              <a:rPr lang="en-US" altLang="ja-JP" sz="2400" dirty="0">
+                <a:latin typeface="Consolas" pitchFamily="49" charset="0"/>
+                <a:cs typeface="Consolas" pitchFamily="49" charset="0"/>
+                <a:sym typeface="Helvetica" charset="0"/>
+              </a:rPr>
+              <a:t>tagged = </a:t>
+            </a:r>
+            <a:r>
+              <a:rPr lang="en-US" altLang="ja-JP" sz="2400" dirty="0" err="1">
+                <a:latin typeface="Consolas" pitchFamily="49" charset="0"/>
+                <a:cs typeface="Consolas" pitchFamily="49" charset="0"/>
+                <a:sym typeface="Helvetica" charset="0"/>
+              </a:rPr>
+              <a:t>nltk.pos_tag</a:t>
+            </a:r>
+            <a:r>
+              <a:rPr lang="en-US" altLang="ja-JP" sz="2400" dirty="0">
+                <a:latin typeface="Consolas" pitchFamily="49" charset="0"/>
+                <a:cs typeface="Consolas" pitchFamily="49" charset="0"/>
+                <a:sym typeface="Helvetica" charset="0"/>
+              </a:rPr>
+              <a:t>(words)</a:t>
+            </a:r>
+          </a:p>
+          <a:p>
+            <a:pPr marL="525463" lvl="2" algn="l">
+              <a:spcBef>
+                <a:spcPts val="1900"/>
+              </a:spcBef>
+              <a:spcAft>
+                <a:spcPts val="1800"/>
+              </a:spcAft>
+              <a:buClr>
+                <a:srgbClr val="6585CF">
+                  <a:lumMod val="75000"/>
+                </a:srgbClr>
+              </a:buClr>
+              <a:tabLst>
+                <a:tab pos="1304925" algn="l"/>
+                <a:tab pos="2346325" algn="l"/>
+                <a:tab pos="1304925" algn="l"/>
+                <a:tab pos="2346325" algn="l"/>
+              </a:tabLst>
+            </a:pPr>
+            <a:r>
+              <a:rPr lang="en-US" altLang="ja-JP" sz="2400" dirty="0">
+                <a:latin typeface="Consolas" pitchFamily="49" charset="0"/>
+                <a:cs typeface="Consolas" pitchFamily="49" charset="0"/>
+                <a:sym typeface="Helvetica" charset="0"/>
+              </a:rPr>
+              <a:t>tagged:</a:t>
+            </a:r>
+            <a:br>
+              <a:rPr lang="en-US" altLang="ja-JP" sz="2400" dirty="0">
+                <a:latin typeface="Consolas" pitchFamily="49" charset="0"/>
+                <a:cs typeface="Consolas" pitchFamily="49" charset="0"/>
+                <a:sym typeface="Helvetica" charset="0"/>
+              </a:rPr>
+            </a:br>
+            <a:r>
+              <a:rPr lang="en-US" altLang="ja-JP" sz="2400" dirty="0">
+                <a:latin typeface="Consolas" pitchFamily="49" charset="0"/>
+                <a:cs typeface="Consolas" pitchFamily="49" charset="0"/>
+                <a:sym typeface="Helvetica" charset="0"/>
+              </a:rPr>
+              <a:t>[(“The”, “DT”), (“cat”, “NN”),…]</a:t>
+            </a:r>
+          </a:p>
+        </p:txBody>
+      </p:sp>
     </p:spTree>
   </p:cSld>
   <p:clrMapOvr>
@@ -6404,7 +7027,15 @@
             <a:pPr lvl="1"/>
             <a:r>
               <a:rPr kumimoji="1" lang="ja-JP" altLang="en-US" dirty="0" smtClean="0"/>
-              <a:t>テストデータが学習データに含まれるとまずい？</a:t>
+              <a:t>テストデータが学習データに含まれる</a:t>
+            </a:r>
+            <a:r>
+              <a:rPr kumimoji="1" lang="ja-JP" altLang="en-US" dirty="0" smtClean="0"/>
+              <a:t>と何がまずい</a:t>
+            </a:r>
+            <a:r>
+              <a:rPr kumimoji="1" lang="ja-JP" altLang="en-US" dirty="0" smtClean="0"/>
+              <a:t>？</a:t>
             </a:r>
             <a:endParaRPr kumimoji="1" lang="en-US" altLang="ja-JP" dirty="0" smtClean="0"/>
           </a:p>
@@ -6442,7 +7073,23 @@
             </a:br>
             <a:r>
               <a:rPr kumimoji="1" lang="en-US" altLang="ja-JP" dirty="0" smtClean="0"/>
-              <a:t>(num. of correct output) / (num. of input cases)</a:t>
+              <a:t>(num. of correct </a:t>
+            </a:r>
+            <a:r>
+              <a:rPr kumimoji="1" lang="en-US" altLang="ja-JP" dirty="0" smtClean="0"/>
+              <a:t>output) </a:t>
+            </a:r>
+            <a:r>
+              <a:rPr kumimoji="1" lang="en-US" altLang="ja-JP" dirty="0" smtClean="0"/>
+              <a:t>/ (num. of input </a:t>
+            </a:r>
+            <a:r>
+              <a:rPr kumimoji="1" lang="en-US" altLang="ja-JP" dirty="0" smtClean="0"/>
+              <a:t>instances</a:t>
+            </a:r>
+            <a:r>
+              <a:rPr kumimoji="1" lang="en-US" altLang="ja-JP" dirty="0" smtClean="0"/>
+              <a:t>)</a:t>
             </a:r>
             <a:endParaRPr kumimoji="1" lang="en-US" altLang="ja-JP" dirty="0"/>
           </a:p>
@@ -6469,6 +7116,677 @@
 </file>
 
 <file path=ppt/slides/slide24.xml><?xml version="1.0" encoding="utf-8"?>
+<p:sld xmlns:a="http://schemas.openxmlformats.org/drawingml/2006/main" xmlns:r="http://schemas.openxmlformats.org/officeDocument/2006/relationships" xmlns:p="http://schemas.openxmlformats.org/presentationml/2006/main">
+  <p:cSld>
+    <p:spTree>
+      <p:nvGrpSpPr>
+        <p:cNvPr id="1" name=""/>
+        <p:cNvGrpSpPr/>
+        <p:nvPr/>
+      </p:nvGrpSpPr>
+      <p:grpSpPr>
+        <a:xfrm>
+          <a:off x="0" y="0"/>
+          <a:ext cx="0" cy="0"/>
+          <a:chOff x="0" y="0"/>
+          <a:chExt cx="0" cy="0"/>
+        </a:xfrm>
+      </p:grpSpPr>
+      <p:sp>
+        <p:nvSpPr>
+          <p:cNvPr id="2" name="Title 1"/>
+          <p:cNvSpPr>
+            <a:spLocks noGrp="1"/>
+          </p:cNvSpPr>
+          <p:nvPr>
+            <p:ph type="title"/>
+          </p:nvPr>
+        </p:nvSpPr>
+        <p:spPr/>
+        <p:txBody>
+          <a:bodyPr/>
+          <a:lstStyle/>
+          <a:p>
+            <a:r>
+              <a:rPr kumimoji="1" lang="ja-JP" altLang="en-US" dirty="0" smtClean="0"/>
+              <a:t>分類器の学習・テストのしかた</a:t>
+            </a:r>
+            <a:endParaRPr kumimoji="1" lang="ja-JP" altLang="en-US" dirty="0"/>
+          </a:p>
+        </p:txBody>
+      </p:sp>
+      <p:sp>
+        <p:nvSpPr>
+          <p:cNvPr id="3" name="Content Placeholder 2"/>
+          <p:cNvSpPr>
+            <a:spLocks noGrp="1"/>
+          </p:cNvSpPr>
+          <p:nvPr>
+            <p:ph sz="quarter" idx="10"/>
+          </p:nvPr>
+        </p:nvSpPr>
+        <p:spPr/>
+        <p:txBody>
+          <a:bodyPr/>
+          <a:lstStyle/>
+          <a:p>
+            <a:r>
+              <a:rPr kumimoji="1" lang="ja-JP" altLang="en-US" dirty="0" smtClean="0"/>
+              <a:t>学習</a:t>
+            </a:r>
+            <a:endParaRPr kumimoji="1" lang="en-US" altLang="ja-JP" dirty="0" smtClean="0"/>
+          </a:p>
+          <a:p>
+            <a:pPr lvl="2"/>
+            <a:r>
+              <a:rPr kumimoji="1" lang="en-US" altLang="ja-JP" sz="2400" dirty="0" err="1">
+                <a:solidFill>
+                  <a:schemeClr val="tx1">
+                    <a:lumMod val="75000"/>
+                    <a:lumOff val="25000"/>
+                  </a:schemeClr>
+                </a:solidFill>
+              </a:rPr>
+              <a:t>def</a:t>
+            </a:r>
+            <a:r>
+              <a:rPr kumimoji="1" lang="en-US" altLang="ja-JP" sz="2400" dirty="0">
+                <a:solidFill>
+                  <a:schemeClr val="tx1">
+                    <a:lumMod val="75000"/>
+                    <a:lumOff val="25000"/>
+                  </a:schemeClr>
+                </a:solidFill>
+              </a:rPr>
+              <a:t> train(</a:t>
+            </a:r>
+            <a:r>
+              <a:rPr kumimoji="1" lang="en-US" altLang="ja-JP" sz="2400" dirty="0" err="1">
+                <a:solidFill>
+                  <a:schemeClr val="tx1">
+                    <a:lumMod val="75000"/>
+                    <a:lumOff val="25000"/>
+                  </a:schemeClr>
+                </a:solidFill>
+              </a:rPr>
+              <a:t>numexamples</a:t>
+            </a:r>
+            <a:r>
+              <a:rPr kumimoji="1" lang="en-US" altLang="ja-JP" sz="2400" dirty="0">
+                <a:solidFill>
+                  <a:schemeClr val="tx1">
+                    <a:lumMod val="75000"/>
+                    <a:lumOff val="25000"/>
+                  </a:schemeClr>
+                </a:solidFill>
+              </a:rPr>
+              <a:t> = </a:t>
+            </a:r>
+            <a:r>
+              <a:rPr kumimoji="1" lang="en-US" altLang="ja-JP" sz="2400" dirty="0" smtClean="0">
+                <a:solidFill>
+                  <a:schemeClr val="tx1">
+                    <a:lumMod val="75000"/>
+                    <a:lumOff val="25000"/>
+                  </a:schemeClr>
+                </a:solidFill>
+              </a:rPr>
+              <a:t>&lt;xxx&gt;, </a:t>
+            </a:r>
+            <a:r>
+              <a:rPr kumimoji="1" lang="en-US" altLang="ja-JP" sz="2400" dirty="0" err="1">
+                <a:solidFill>
+                  <a:schemeClr val="tx1">
+                    <a:lumMod val="75000"/>
+                    <a:lumOff val="25000"/>
+                  </a:schemeClr>
+                </a:solidFill>
+              </a:rPr>
+              <a:t>numiter</a:t>
+            </a:r>
+            <a:r>
+              <a:rPr kumimoji="1" lang="en-US" altLang="ja-JP" sz="2400" dirty="0">
+                <a:solidFill>
+                  <a:schemeClr val="tx1">
+                    <a:lumMod val="75000"/>
+                    <a:lumOff val="25000"/>
+                  </a:schemeClr>
+                </a:solidFill>
+              </a:rPr>
+              <a:t> = </a:t>
+            </a:r>
+            <a:r>
+              <a:rPr kumimoji="1" lang="en-US" altLang="ja-JP" sz="2400" dirty="0" smtClean="0">
+                <a:solidFill>
+                  <a:schemeClr val="tx1">
+                    <a:lumMod val="75000"/>
+                    <a:lumOff val="25000"/>
+                  </a:schemeClr>
+                </a:solidFill>
+              </a:rPr>
+              <a:t>&lt;xxx&gt;):     </a:t>
+            </a:r>
+            <a:r>
+              <a:rPr kumimoji="1" lang="en-US" altLang="ja-JP" sz="2400" dirty="0">
+                <a:solidFill>
+                  <a:schemeClr val="tx1">
+                    <a:lumMod val="75000"/>
+                    <a:lumOff val="25000"/>
+                  </a:schemeClr>
+                </a:solidFill>
+              </a:rPr>
+              <a:t/>
+            </a:r>
+            <a:br>
+              <a:rPr kumimoji="1" lang="en-US" altLang="ja-JP" sz="2400" dirty="0">
+                <a:solidFill>
+                  <a:schemeClr val="tx1">
+                    <a:lumMod val="75000"/>
+                    <a:lumOff val="25000"/>
+                  </a:schemeClr>
+                </a:solidFill>
+              </a:rPr>
+            </a:br>
+            <a:r>
+              <a:rPr kumimoji="1" lang="en-US" altLang="ja-JP" sz="2400" dirty="0">
+                <a:solidFill>
+                  <a:schemeClr val="tx1">
+                    <a:lumMod val="75000"/>
+                    <a:lumOff val="25000"/>
+                  </a:schemeClr>
+                </a:solidFill>
+              </a:rPr>
+              <a:t>    </a:t>
+            </a:r>
+            <a:r>
+              <a:rPr kumimoji="1" lang="en-US" altLang="ja-JP" sz="2400" dirty="0" err="1">
+                <a:solidFill>
+                  <a:schemeClr val="tx1">
+                    <a:lumMod val="75000"/>
+                    <a:lumOff val="25000"/>
+                  </a:schemeClr>
+                </a:solidFill>
+              </a:rPr>
+              <a:t>trainset_features</a:t>
+            </a:r>
+            <a:r>
+              <a:rPr kumimoji="1" lang="en-US" altLang="ja-JP" sz="2400" dirty="0">
+                <a:solidFill>
+                  <a:schemeClr val="tx1">
+                    <a:lumMod val="75000"/>
+                    <a:lumOff val="25000"/>
+                  </a:schemeClr>
+                </a:solidFill>
+              </a:rPr>
+              <a:t> = &lt;a list of dictionaries&gt;</a:t>
+            </a:r>
+            <a:br>
+              <a:rPr kumimoji="1" lang="en-US" altLang="ja-JP" sz="2400" dirty="0">
+                <a:solidFill>
+                  <a:schemeClr val="tx1">
+                    <a:lumMod val="75000"/>
+                    <a:lumOff val="25000"/>
+                  </a:schemeClr>
+                </a:solidFill>
+              </a:rPr>
+            </a:br>
+            <a:r>
+              <a:rPr kumimoji="1" lang="en-US" altLang="ja-JP" sz="2400" dirty="0">
+                <a:solidFill>
+                  <a:schemeClr val="tx1">
+                    <a:lumMod val="75000"/>
+                    <a:lumOff val="25000"/>
+                  </a:schemeClr>
+                </a:solidFill>
+              </a:rPr>
+              <a:t>    </a:t>
+            </a:r>
+            <a:r>
+              <a:rPr kumimoji="1" lang="en-US" altLang="ja-JP" sz="2400" dirty="0" err="1">
+                <a:solidFill>
+                  <a:schemeClr val="tx1">
+                    <a:lumMod val="75000"/>
+                    <a:lumOff val="25000"/>
+                  </a:schemeClr>
+                </a:solidFill>
+              </a:rPr>
+              <a:t>trainset_labels</a:t>
+            </a:r>
+            <a:r>
+              <a:rPr kumimoji="1" lang="en-US" altLang="ja-JP" sz="2400" dirty="0">
+                <a:solidFill>
+                  <a:schemeClr val="tx1">
+                    <a:lumMod val="75000"/>
+                    <a:lumOff val="25000"/>
+                  </a:schemeClr>
+                </a:solidFill>
+              </a:rPr>
+              <a:t> = &lt;a list of strings&gt;</a:t>
+            </a:r>
+            <a:r>
+              <a:rPr kumimoji="1" lang="en-US" altLang="ja-JP" sz="2400" dirty="0"/>
+              <a:t/>
+            </a:r>
+            <a:br>
+              <a:rPr kumimoji="1" lang="en-US" altLang="ja-JP" sz="2400" dirty="0"/>
+            </a:br>
+            <a:r>
+              <a:rPr kumimoji="1" lang="en-US" altLang="ja-JP" sz="2400" dirty="0"/>
+              <a:t>    </a:t>
+            </a:r>
+            <a:r>
+              <a:rPr kumimoji="1" lang="en-US" altLang="ja-JP" sz="2400" dirty="0" err="1">
+                <a:solidFill>
+                  <a:schemeClr val="tx1">
+                    <a:lumMod val="75000"/>
+                    <a:lumOff val="25000"/>
+                  </a:schemeClr>
+                </a:solidFill>
+              </a:rPr>
+              <a:t>trainset</a:t>
+            </a:r>
+            <a:r>
+              <a:rPr kumimoji="1" lang="en-US" altLang="ja-JP" sz="2400" dirty="0">
+                <a:solidFill>
+                  <a:schemeClr val="tx1">
+                    <a:lumMod val="75000"/>
+                    <a:lumOff val="25000"/>
+                  </a:schemeClr>
+                </a:solidFill>
+              </a:rPr>
+              <a:t> = zip(</a:t>
+            </a:r>
+            <a:r>
+              <a:rPr kumimoji="1" lang="en-US" altLang="ja-JP" sz="2400" dirty="0" err="1">
+                <a:solidFill>
+                  <a:schemeClr val="tx1">
+                    <a:lumMod val="75000"/>
+                    <a:lumOff val="25000"/>
+                  </a:schemeClr>
+                </a:solidFill>
+              </a:rPr>
+              <a:t>trainset_features</a:t>
+            </a:r>
+            <a:r>
+              <a:rPr kumimoji="1" lang="en-US" altLang="ja-JP" sz="2400" dirty="0">
+                <a:solidFill>
+                  <a:schemeClr val="tx1">
+                    <a:lumMod val="75000"/>
+                    <a:lumOff val="25000"/>
+                  </a:schemeClr>
+                </a:solidFill>
+              </a:rPr>
+              <a:t>, </a:t>
+            </a:r>
+            <a:r>
+              <a:rPr kumimoji="1" lang="en-US" altLang="ja-JP" sz="2400" dirty="0" err="1">
+                <a:solidFill>
+                  <a:schemeClr val="tx1">
+                    <a:lumMod val="75000"/>
+                    <a:lumOff val="25000"/>
+                  </a:schemeClr>
+                </a:solidFill>
+              </a:rPr>
+              <a:t>trainset_labels</a:t>
+            </a:r>
+            <a:r>
+              <a:rPr kumimoji="1" lang="en-US" altLang="ja-JP" sz="2400" dirty="0">
+                <a:solidFill>
+                  <a:schemeClr val="tx1">
+                    <a:lumMod val="75000"/>
+                    <a:lumOff val="25000"/>
+                  </a:schemeClr>
+                </a:solidFill>
+              </a:rPr>
+              <a:t>)</a:t>
+            </a:r>
+            <a:r>
+              <a:rPr kumimoji="1" lang="en-US" altLang="ja-JP" sz="2400" dirty="0"/>
+              <a:t>  </a:t>
+            </a:r>
+            <a:br>
+              <a:rPr kumimoji="1" lang="en-US" altLang="ja-JP" sz="2400" dirty="0"/>
+            </a:br>
+            <a:r>
+              <a:rPr kumimoji="1" lang="en-US" altLang="ja-JP" sz="2400" dirty="0"/>
+              <a:t>    classifier = </a:t>
+            </a:r>
+            <a:br>
+              <a:rPr kumimoji="1" lang="en-US" altLang="ja-JP" sz="2400" dirty="0"/>
+            </a:br>
+            <a:r>
+              <a:rPr kumimoji="1" lang="en-US" altLang="ja-JP" sz="2400" dirty="0"/>
+              <a:t>    </a:t>
+            </a:r>
+            <a:r>
+              <a:rPr kumimoji="1" lang="en-US" altLang="ja-JP" sz="2400" dirty="0" err="1"/>
+              <a:t>nltk.MaxentClassifier.train</a:t>
+            </a:r>
+            <a:r>
+              <a:rPr kumimoji="1" lang="en-US" altLang="ja-JP" sz="2400" dirty="0"/>
+              <a:t>(</a:t>
+            </a:r>
+            <a:r>
+              <a:rPr kumimoji="1" lang="en-US" altLang="ja-JP" sz="2400" dirty="0" err="1"/>
+              <a:t>trainset</a:t>
+            </a:r>
+            <a:r>
+              <a:rPr kumimoji="1" lang="en-US" altLang="ja-JP" sz="2400" dirty="0"/>
+              <a:t>, algorithm="IIS", </a:t>
+            </a:r>
+            <a:r>
+              <a:rPr kumimoji="1" lang="en-US" altLang="ja-JP" sz="2400" dirty="0" smtClean="0"/>
+              <a:t/>
+            </a:r>
+            <a:br>
+              <a:rPr kumimoji="1" lang="en-US" altLang="ja-JP" sz="2400" dirty="0" smtClean="0"/>
+            </a:br>
+            <a:r>
+              <a:rPr kumimoji="1" lang="en-US" altLang="ja-JP" sz="2400" dirty="0" smtClean="0"/>
+              <a:t>									</a:t>
+            </a:r>
+            <a:r>
+              <a:rPr kumimoji="1" lang="en-US" altLang="ja-JP" sz="2400" dirty="0" err="1" smtClean="0"/>
+              <a:t>max_iter</a:t>
+            </a:r>
+            <a:r>
+              <a:rPr kumimoji="1" lang="en-US" altLang="ja-JP" sz="2400" dirty="0" smtClean="0"/>
+              <a:t>=</a:t>
+            </a:r>
+            <a:r>
+              <a:rPr kumimoji="1" lang="en-US" altLang="ja-JP" sz="2400" dirty="0" err="1" smtClean="0"/>
+              <a:t>numiter</a:t>
+            </a:r>
+            <a:r>
+              <a:rPr kumimoji="1" lang="en-US" altLang="ja-JP" sz="2400" dirty="0" smtClean="0"/>
+              <a:t>)</a:t>
+            </a:r>
+            <a:endParaRPr kumimoji="1" lang="en-US" altLang="ja-JP" dirty="0" smtClean="0"/>
+          </a:p>
+          <a:p>
+            <a:r>
+              <a:rPr kumimoji="1" lang="en-US" altLang="ja-JP" dirty="0" smtClean="0"/>
+              <a:t> </a:t>
+            </a:r>
+            <a:r>
+              <a:rPr kumimoji="1" lang="ja-JP" altLang="en-US" dirty="0" smtClean="0"/>
+              <a:t>テスト</a:t>
+            </a:r>
+            <a:endParaRPr kumimoji="1" lang="en-US" altLang="ja-JP" dirty="0" smtClean="0"/>
+          </a:p>
+          <a:p>
+            <a:pPr lvl="2"/>
+            <a:r>
+              <a:rPr kumimoji="1" lang="en-US" altLang="ja-JP" sz="2400" dirty="0" err="1" smtClean="0">
+                <a:solidFill>
+                  <a:schemeClr val="tx1">
+                    <a:lumMod val="75000"/>
+                    <a:lumOff val="25000"/>
+                  </a:schemeClr>
+                </a:solidFill>
+              </a:rPr>
+              <a:t>def</a:t>
+            </a:r>
+            <a:r>
+              <a:rPr kumimoji="1" lang="en-US" altLang="ja-JP" sz="2400" dirty="0" smtClean="0">
+                <a:solidFill>
+                  <a:schemeClr val="tx1">
+                    <a:lumMod val="75000"/>
+                    <a:lumOff val="25000"/>
+                  </a:schemeClr>
+                </a:solidFill>
+              </a:rPr>
+              <a:t> test(classifier):</a:t>
+            </a:r>
+            <a:br>
+              <a:rPr kumimoji="1" lang="en-US" altLang="ja-JP" sz="2400" dirty="0" smtClean="0">
+                <a:solidFill>
+                  <a:schemeClr val="tx1">
+                    <a:lumMod val="75000"/>
+                    <a:lumOff val="25000"/>
+                  </a:schemeClr>
+                </a:solidFill>
+              </a:rPr>
+            </a:br>
+            <a:r>
+              <a:rPr kumimoji="1" lang="en-US" altLang="ja-JP" sz="2400" dirty="0" smtClean="0">
+                <a:solidFill>
+                  <a:schemeClr val="tx1">
+                    <a:lumMod val="75000"/>
+                    <a:lumOff val="25000"/>
+                  </a:schemeClr>
+                </a:solidFill>
+              </a:rPr>
+              <a:t>    </a:t>
+            </a:r>
+            <a:r>
+              <a:rPr kumimoji="1" lang="en-US" altLang="ja-JP" sz="2400" dirty="0" err="1" smtClean="0">
+                <a:solidFill>
+                  <a:schemeClr val="tx1">
+                    <a:lumMod val="75000"/>
+                    <a:lumOff val="25000"/>
+                  </a:schemeClr>
+                </a:solidFill>
+              </a:rPr>
+              <a:t>testset_features</a:t>
+            </a:r>
+            <a:r>
+              <a:rPr kumimoji="1" lang="en-US" altLang="ja-JP" sz="2400" dirty="0" smtClean="0">
+                <a:solidFill>
+                  <a:schemeClr val="tx1">
+                    <a:lumMod val="75000"/>
+                    <a:lumOff val="25000"/>
+                  </a:schemeClr>
+                </a:solidFill>
+              </a:rPr>
+              <a:t> </a:t>
+            </a:r>
+            <a:r>
+              <a:rPr kumimoji="1" lang="en-US" altLang="ja-JP" sz="2400" dirty="0">
+                <a:solidFill>
+                  <a:schemeClr val="tx1">
+                    <a:lumMod val="75000"/>
+                    <a:lumOff val="25000"/>
+                  </a:schemeClr>
+                </a:solidFill>
+              </a:rPr>
+              <a:t>= </a:t>
+            </a:r>
+            <a:r>
+              <a:rPr kumimoji="1" lang="en-US" altLang="ja-JP" sz="2400" dirty="0" smtClean="0">
+                <a:solidFill>
+                  <a:schemeClr val="tx1">
+                    <a:lumMod val="75000"/>
+                    <a:lumOff val="25000"/>
+                  </a:schemeClr>
+                </a:solidFill>
+              </a:rPr>
+              <a:t>&lt;a list of dictionaries&gt;</a:t>
+            </a:r>
+            <a:br>
+              <a:rPr kumimoji="1" lang="en-US" altLang="ja-JP" sz="2400" dirty="0" smtClean="0">
+                <a:solidFill>
+                  <a:schemeClr val="tx1">
+                    <a:lumMod val="75000"/>
+                    <a:lumOff val="25000"/>
+                  </a:schemeClr>
+                </a:solidFill>
+              </a:rPr>
+            </a:br>
+            <a:r>
+              <a:rPr kumimoji="1" lang="en-US" altLang="ja-JP" sz="2400" dirty="0" smtClean="0">
+                <a:solidFill>
+                  <a:schemeClr val="tx1">
+                    <a:lumMod val="75000"/>
+                    <a:lumOff val="25000"/>
+                  </a:schemeClr>
+                </a:solidFill>
+              </a:rPr>
+              <a:t>    </a:t>
+            </a:r>
+            <a:r>
+              <a:rPr kumimoji="1" lang="en-US" altLang="ja-JP" sz="2400" dirty="0" err="1" smtClean="0">
+                <a:solidFill>
+                  <a:schemeClr val="tx1">
+                    <a:lumMod val="75000"/>
+                    <a:lumOff val="25000"/>
+                  </a:schemeClr>
+                </a:solidFill>
+              </a:rPr>
+              <a:t>testset_labels</a:t>
+            </a:r>
+            <a:r>
+              <a:rPr kumimoji="1" lang="en-US" altLang="ja-JP" sz="2400" dirty="0" smtClean="0">
+                <a:solidFill>
+                  <a:schemeClr val="tx1">
+                    <a:lumMod val="75000"/>
+                    <a:lumOff val="25000"/>
+                  </a:schemeClr>
+                </a:solidFill>
+              </a:rPr>
+              <a:t>   = &lt;a list of strings&gt;</a:t>
+            </a:r>
+            <a:r>
+              <a:rPr kumimoji="1" lang="en-US" altLang="ja-JP" sz="2400" dirty="0" smtClean="0"/>
+              <a:t/>
+            </a:r>
+            <a:br>
+              <a:rPr kumimoji="1" lang="en-US" altLang="ja-JP" sz="2400" dirty="0" smtClean="0"/>
+            </a:br>
+            <a:r>
+              <a:rPr kumimoji="1" lang="en-US" altLang="ja-JP" sz="2400" dirty="0" smtClean="0"/>
+              <a:t>    </a:t>
+            </a:r>
+            <a:r>
+              <a:rPr kumimoji="1" lang="en-US" altLang="ja-JP" sz="2400" dirty="0" err="1" smtClean="0">
+                <a:solidFill>
+                  <a:schemeClr val="tx1">
+                    <a:lumMod val="75000"/>
+                    <a:lumOff val="25000"/>
+                  </a:schemeClr>
+                </a:solidFill>
+              </a:rPr>
+              <a:t>testset</a:t>
+            </a:r>
+            <a:r>
+              <a:rPr kumimoji="1" lang="en-US" altLang="ja-JP" sz="2400" dirty="0" smtClean="0">
+                <a:solidFill>
+                  <a:schemeClr val="tx1">
+                    <a:lumMod val="75000"/>
+                    <a:lumOff val="25000"/>
+                  </a:schemeClr>
+                </a:solidFill>
+              </a:rPr>
+              <a:t> </a:t>
+            </a:r>
+            <a:r>
+              <a:rPr kumimoji="1" lang="en-US" altLang="ja-JP" sz="2400" dirty="0">
+                <a:solidFill>
+                  <a:schemeClr val="tx1">
+                    <a:lumMod val="75000"/>
+                    <a:lumOff val="25000"/>
+                  </a:schemeClr>
+                </a:solidFill>
+              </a:rPr>
+              <a:t>= zip(</a:t>
+            </a:r>
+            <a:r>
+              <a:rPr kumimoji="1" lang="en-US" altLang="ja-JP" sz="2400" dirty="0" err="1">
+                <a:solidFill>
+                  <a:schemeClr val="tx1">
+                    <a:lumMod val="75000"/>
+                    <a:lumOff val="25000"/>
+                  </a:schemeClr>
+                </a:solidFill>
+              </a:rPr>
+              <a:t>testset_features</a:t>
+            </a:r>
+            <a:r>
+              <a:rPr kumimoji="1" lang="en-US" altLang="ja-JP" sz="2400" dirty="0">
+                <a:solidFill>
+                  <a:schemeClr val="tx1">
+                    <a:lumMod val="75000"/>
+                    <a:lumOff val="25000"/>
+                  </a:schemeClr>
+                </a:solidFill>
+              </a:rPr>
+              <a:t>, </a:t>
+            </a:r>
+            <a:r>
+              <a:rPr kumimoji="1" lang="en-US" altLang="ja-JP" sz="2400" dirty="0" err="1" smtClean="0">
+                <a:solidFill>
+                  <a:schemeClr val="tx1">
+                    <a:lumMod val="75000"/>
+                    <a:lumOff val="25000"/>
+                  </a:schemeClr>
+                </a:solidFill>
+              </a:rPr>
+              <a:t>testset_labels</a:t>
+            </a:r>
+            <a:r>
+              <a:rPr kumimoji="1" lang="en-US" altLang="ja-JP" sz="2400" dirty="0" smtClean="0">
+                <a:solidFill>
+                  <a:schemeClr val="tx1">
+                    <a:lumMod val="75000"/>
+                    <a:lumOff val="25000"/>
+                  </a:schemeClr>
+                </a:solidFill>
+              </a:rPr>
+              <a:t>)</a:t>
+            </a:r>
+            <a:br>
+              <a:rPr kumimoji="1" lang="en-US" altLang="ja-JP" sz="2400" dirty="0" smtClean="0">
+                <a:solidFill>
+                  <a:schemeClr val="tx1">
+                    <a:lumMod val="75000"/>
+                    <a:lumOff val="25000"/>
+                  </a:schemeClr>
+                </a:solidFill>
+              </a:rPr>
+            </a:br>
+            <a:r>
+              <a:rPr kumimoji="1" lang="en-US" altLang="ja-JP" sz="2400" dirty="0" smtClean="0"/>
+              <a:t>    accuracy = </a:t>
+            </a:r>
+            <a:r>
+              <a:rPr kumimoji="1" lang="en-US" altLang="ja-JP" sz="2400" dirty="0" err="1" smtClean="0"/>
+              <a:t>nltk.classify.accuracy</a:t>
+            </a:r>
+            <a:r>
+              <a:rPr kumimoji="1" lang="en-US" altLang="ja-JP" sz="2400" dirty="0" smtClean="0"/>
+              <a:t>(classifier</a:t>
+            </a:r>
+            <a:r>
+              <a:rPr kumimoji="1" lang="en-US" altLang="ja-JP" sz="2400" dirty="0"/>
+              <a:t>, </a:t>
+            </a:r>
+            <a:r>
+              <a:rPr kumimoji="1" lang="en-US" altLang="ja-JP" sz="2400" dirty="0" err="1"/>
+              <a:t>testset</a:t>
+            </a:r>
+            <a:r>
+              <a:rPr kumimoji="1" lang="en-US" altLang="ja-JP" sz="2400" dirty="0"/>
+              <a:t>)</a:t>
+            </a:r>
+            <a:endParaRPr kumimoji="1" lang="en-US" altLang="ja-JP" sz="2400" dirty="0" smtClean="0"/>
+          </a:p>
+        </p:txBody>
+      </p:sp>
+    </p:spTree>
+    <p:extLst>
+      <p:ext uri="{BB962C8B-B14F-4D97-AF65-F5344CB8AC3E}">
+        <p14:creationId xmlns:p14="http://schemas.microsoft.com/office/powerpoint/2010/main" val="4230010490"/>
+      </p:ext>
+    </p:extLst>
+  </p:cSld>
+  <p:clrMapOvr>
+    <a:masterClrMapping/>
+  </p:clrMapOvr>
+  <p:transition/>
+</p:sld>
+</file>
+
+<file path=ppt/slides/slide25.xml><?xml version="1.0" encoding="utf-8"?>
 <p:sld xmlns:a="http://schemas.openxmlformats.org/drawingml/2006/main" xmlns:r="http://schemas.openxmlformats.org/officeDocument/2006/relationships" xmlns:p="http://schemas.openxmlformats.org/presentationml/2006/main">
   <p:cSld>
     <p:spTree>
@@ -6589,405 +7907,13 @@
           <a:p>
             <a:r>
               <a:rPr lang="ja-JP" altLang="en-US" dirty="0"/>
-              <a:t>終わらないかも・・・</a:t>
-            </a:r>
-          </a:p>
-        </p:txBody>
-      </p:sp>
-    </p:spTree>
-  </p:cSld>
-  <p:clrMapOvr>
-    <a:masterClrMapping/>
-  </p:clrMapOvr>
-  <p:transition/>
-  <p:timing>
-    <p:tnLst>
-      <p:par>
-        <p:cTn id="1" dur="indefinite" restart="never" nodeType="tmRoot"/>
-      </p:par>
-    </p:tnLst>
-  </p:timing>
-</p:sld>
-</file>
-
-<file path=ppt/slides/slide25.xml><?xml version="1.0" encoding="utf-8"?>
-<p:sld xmlns:a="http://schemas.openxmlformats.org/drawingml/2006/main" xmlns:r="http://schemas.openxmlformats.org/officeDocument/2006/relationships" xmlns:p="http://schemas.openxmlformats.org/presentationml/2006/main">
-  <p:cSld>
-    <p:spTree>
-      <p:nvGrpSpPr>
-        <p:cNvPr id="1" name=""/>
-        <p:cNvGrpSpPr/>
-        <p:nvPr/>
-      </p:nvGrpSpPr>
-      <p:grpSpPr>
-        <a:xfrm>
-          <a:off x="0" y="0"/>
-          <a:ext cx="0" cy="0"/>
-          <a:chOff x="0" y="0"/>
-          <a:chExt cx="0" cy="0"/>
-        </a:xfrm>
-      </p:grpSpPr>
-      <p:sp>
-        <p:nvSpPr>
-          <p:cNvPr id="30721" name="Rectangle 1"/>
-          <p:cNvSpPr>
-            <a:spLocks noGrp="1" noChangeArrowheads="1"/>
-          </p:cNvSpPr>
-          <p:nvPr>
-            <p:ph type="title"/>
-          </p:nvPr>
-        </p:nvSpPr>
-        <p:spPr>
-          <a:ln/>
-        </p:spPr>
-        <p:txBody>
-          <a:bodyPr/>
-          <a:lstStyle/>
-          <a:p>
-            <a:r>
-              <a:rPr lang="ja-JP" altLang="en-US" dirty="0"/>
-              <a:t>評価</a:t>
-            </a:r>
-            <a:r>
-              <a:rPr lang="en-US" altLang="ja-JP" dirty="0"/>
-              <a:t>: </a:t>
-            </a:r>
-            <a:r>
-              <a:rPr lang="ja-JP" altLang="en-US" dirty="0"/>
-              <a:t>そのモデルで大丈夫</a:t>
-            </a:r>
-            <a:r>
-              <a:rPr lang="en-US" altLang="ja-JP" dirty="0"/>
-              <a:t>?</a:t>
-            </a:r>
-          </a:p>
-        </p:txBody>
-      </p:sp>
-      <p:sp>
-        <p:nvSpPr>
-          <p:cNvPr id="4" name="Slide Number Placeholder 3"/>
-          <p:cNvSpPr>
-            <a:spLocks noGrp="1"/>
-          </p:cNvSpPr>
-          <p:nvPr>
-            <p:ph type="sldNum" sz="quarter" idx="4"/>
-          </p:nvPr>
-        </p:nvSpPr>
-        <p:spPr>
-          <a:prstGeom prst="rect">
-            <a:avLst/>
-          </a:prstGeom>
-        </p:spPr>
-        <p:txBody>
-          <a:bodyPr/>
-          <a:lstStyle/>
-          <a:p>
-            <a:fld id="{A9D3CB40-E20B-49ED-91F9-0F8BA9CA454A}" type="slidenum">
-              <a:rPr lang="en-US" altLang="ja-JP"/>
-              <a:pPr/>
-              <a:t>25</a:t>
-            </a:fld>
-            <a:endParaRPr lang="en-US" altLang="ja-JP"/>
-          </a:p>
-        </p:txBody>
-      </p:sp>
-      <p:sp>
-        <p:nvSpPr>
-          <p:cNvPr id="30722" name="Rectangle 2"/>
-          <p:cNvSpPr>
-            <a:spLocks noGrp="1" noChangeArrowheads="1"/>
-          </p:cNvSpPr>
-          <p:nvPr>
-            <p:ph sz="quarter" idx="10"/>
-          </p:nvPr>
-        </p:nvSpPr>
-        <p:spPr>
-          <a:ln/>
-        </p:spPr>
-        <p:txBody>
-          <a:bodyPr/>
-          <a:lstStyle/>
-          <a:p>
-            <a:pPr>
-              <a:tabLst>
-                <a:tab pos="1304925" algn="l"/>
-                <a:tab pos="2346325" algn="l"/>
-                <a:tab pos="1304925" algn="l"/>
-                <a:tab pos="2346325" algn="l"/>
-                <a:tab pos="1304925" algn="l"/>
-                <a:tab pos="2346325" algn="l"/>
-              </a:tabLst>
-            </a:pPr>
-            <a:r>
-              <a:rPr lang="en-US" altLang="ja-JP" dirty="0" smtClean="0"/>
-              <a:t>Accuracy</a:t>
+              <a:t>終わらないかも・・</a:t>
             </a:r>
             <a:r>
               <a:rPr lang="ja-JP" altLang="en-US" dirty="0" smtClean="0"/>
-              <a:t>はどうでしたか？</a:t>
-            </a:r>
-            <a:endParaRPr lang="en-US" altLang="ja-JP" dirty="0" smtClean="0"/>
-          </a:p>
-          <a:p>
-            <a:pPr>
-              <a:tabLst>
-                <a:tab pos="1304925" algn="l"/>
-                <a:tab pos="2346325" algn="l"/>
-                <a:tab pos="1304925" algn="l"/>
-                <a:tab pos="2346325" algn="l"/>
-                <a:tab pos="1304925" algn="l"/>
-                <a:tab pos="2346325" algn="l"/>
-              </a:tabLst>
-            </a:pPr>
-            <a:r>
-              <a:rPr lang="en-US" altLang="ja-JP" dirty="0" err="1" smtClean="0"/>
-              <a:t>MaxentClassifier</a:t>
-            </a:r>
-            <a:r>
-              <a:rPr lang="ja-JP" altLang="en-US" dirty="0"/>
-              <a:t>は多クラス分類器</a:t>
-            </a:r>
-          </a:p>
-          <a:p>
-            <a:pPr marL="842963" lvl="1">
-              <a:tabLst>
-                <a:tab pos="1304925" algn="l"/>
-                <a:tab pos="2346325" algn="l"/>
-                <a:tab pos="1304925" algn="l"/>
-                <a:tab pos="2346325" algn="l"/>
-                <a:tab pos="1304925" algn="l"/>
-                <a:tab pos="2346325" algn="l"/>
-              </a:tabLst>
-            </a:pPr>
-            <a:r>
-              <a:rPr lang="ja-JP" altLang="en-US" dirty="0"/>
-              <a:t>本当</a:t>
-            </a:r>
-            <a:r>
-              <a:rPr lang="ja-JP" altLang="en-US" dirty="0" smtClean="0"/>
-              <a:t>は </a:t>
-            </a:r>
-            <a:r>
-              <a:rPr lang="en-US" altLang="ja-JP" dirty="0" smtClean="0">
-                <a:latin typeface="Helvetica"/>
-              </a:rPr>
-              <a:t>“</a:t>
-            </a:r>
-            <a:r>
-              <a:rPr lang="en-US" altLang="ja-JP" dirty="0" smtClean="0"/>
-              <a:t>at</a:t>
-            </a:r>
-            <a:r>
-              <a:rPr lang="en-US" altLang="ja-JP" dirty="0" smtClean="0">
-                <a:latin typeface="Helvetica"/>
-              </a:rPr>
-              <a:t>”</a:t>
-            </a:r>
-            <a:r>
-              <a:rPr lang="en-US" altLang="ja-JP" dirty="0" smtClean="0"/>
-              <a:t> </a:t>
-            </a:r>
-            <a:r>
-              <a:rPr lang="ja-JP" altLang="en-US" dirty="0" err="1" smtClean="0"/>
-              <a:t>だったのに</a:t>
-            </a:r>
-            <a:r>
-              <a:rPr lang="ja-JP" altLang="en-US" dirty="0">
-                <a:latin typeface="Helvetica"/>
-              </a:rPr>
-              <a:t> </a:t>
-            </a:r>
-            <a:r>
-              <a:rPr lang="en-US" altLang="ja-JP" dirty="0" smtClean="0">
-                <a:latin typeface="Helvetica"/>
-              </a:rPr>
-              <a:t>“</a:t>
-            </a:r>
-            <a:r>
-              <a:rPr lang="en-US" altLang="ja-JP" dirty="0" smtClean="0"/>
-              <a:t>in</a:t>
-            </a:r>
-            <a:r>
-              <a:rPr lang="en-US" altLang="ja-JP" dirty="0" smtClean="0">
-                <a:latin typeface="Helvetica"/>
-              </a:rPr>
-              <a:t>”</a:t>
-            </a:r>
-            <a:r>
-              <a:rPr lang="en-US" altLang="ja-JP" dirty="0" smtClean="0"/>
-              <a:t> </a:t>
-            </a:r>
-            <a:r>
-              <a:rPr lang="ja-JP" altLang="en-US" dirty="0"/>
-              <a:t>だと出力した場合</a:t>
-            </a:r>
-            <a:r>
-              <a:rPr lang="ja-JP" altLang="en-US" dirty="0" smtClean="0"/>
-              <a:t>と </a:t>
-            </a:r>
-            <a:r>
-              <a:rPr lang="en-US" altLang="ja-JP" dirty="0" smtClean="0">
-                <a:latin typeface="Helvetica"/>
-              </a:rPr>
-              <a:t>“</a:t>
-            </a:r>
-            <a:r>
-              <a:rPr lang="en-US" altLang="ja-JP" dirty="0" smtClean="0"/>
-              <a:t>on</a:t>
-            </a:r>
-            <a:r>
-              <a:rPr lang="en-US" altLang="ja-JP" dirty="0" smtClean="0">
-                <a:latin typeface="Helvetica"/>
-              </a:rPr>
-              <a:t>” </a:t>
-            </a:r>
-            <a:r>
-              <a:rPr lang="ja-JP" altLang="en-US" dirty="0" smtClean="0"/>
-              <a:t>だと</a:t>
-            </a:r>
-            <a:r>
-              <a:rPr lang="ja-JP" altLang="en-US" dirty="0"/>
-              <a:t>出力した場合はどちらが多いんだろう</a:t>
-            </a:r>
-            <a:r>
-              <a:rPr lang="en-US" altLang="ja-JP" dirty="0" smtClean="0">
-                <a:latin typeface="Helvetica"/>
-              </a:rPr>
-              <a:t>…</a:t>
-            </a:r>
-            <a:endParaRPr lang="en-US" altLang="ja-JP" dirty="0"/>
-          </a:p>
-          <a:p>
-            <a:pPr marL="484188" lvl="2">
-              <a:tabLst>
-                <a:tab pos="1304925" algn="l"/>
-                <a:tab pos="2346325" algn="l"/>
-                <a:tab pos="1304925" algn="l"/>
-                <a:tab pos="2346325" algn="l"/>
-                <a:tab pos="1304925" algn="l"/>
-                <a:tab pos="2346325" algn="l"/>
-              </a:tabLst>
-            </a:pPr>
-            <a:r>
-              <a:rPr lang="en-US" altLang="ja-JP" b="0" dirty="0" smtClean="0"/>
-              <a:t>	</a:t>
-            </a:r>
-            <a:r>
-              <a:rPr lang="ja-JP" altLang="en-US" b="0" dirty="0" smtClean="0"/>
-              <a:t>分類器が間違いやすいケースを特定したい！</a:t>
-            </a:r>
-            <a:endParaRPr lang="ja-JP" altLang="en-US" b="0" dirty="0"/>
-          </a:p>
-          <a:p>
-            <a:pPr marL="842963" lvl="1">
-              <a:tabLst>
-                <a:tab pos="1304925" algn="l"/>
-                <a:tab pos="2346325" algn="l"/>
-                <a:tab pos="1304925" algn="l"/>
-                <a:tab pos="2346325" algn="l"/>
-                <a:tab pos="1304925" algn="l"/>
-                <a:tab pos="2346325" algn="l"/>
-              </a:tabLst>
-            </a:pPr>
-            <a:r>
-              <a:rPr lang="ja-JP" altLang="en-US" dirty="0"/>
-              <a:t>そこで混同行列</a:t>
-            </a:r>
-            <a:r>
-              <a:rPr lang="en-US" altLang="ja-JP" dirty="0"/>
-              <a:t>(Confusion Matrix</a:t>
-            </a:r>
-            <a:r>
-              <a:rPr lang="en-US" altLang="ja-JP" dirty="0" smtClean="0"/>
-              <a:t>)</a:t>
-            </a:r>
-            <a:r>
-              <a:rPr lang="ja-JP" altLang="en-US" dirty="0" smtClean="0"/>
-              <a:t>！</a:t>
-            </a:r>
-            <a:endParaRPr lang="en-US" altLang="ja-JP" dirty="0"/>
-          </a:p>
-          <a:p>
-            <a:pPr marL="525463" lvl="2">
-              <a:tabLst>
-                <a:tab pos="1304925" algn="l"/>
-                <a:tab pos="2346325" algn="l"/>
-                <a:tab pos="1304925" algn="l"/>
-                <a:tab pos="2346325" algn="l"/>
-                <a:tab pos="1304925" algn="l"/>
-                <a:tab pos="2346325" algn="l"/>
-              </a:tabLst>
-            </a:pPr>
-            <a:r>
-              <a:rPr lang="en-US" altLang="ja-JP" dirty="0" err="1"/>
-              <a:t>classifier_outputs</a:t>
-            </a:r>
-            <a:r>
-              <a:rPr lang="en-US" altLang="ja-JP" dirty="0"/>
-              <a:t> = </a:t>
-            </a:r>
-            <a:r>
-              <a:rPr lang="en-US" altLang="ja-JP" dirty="0" err="1" smtClean="0"/>
-              <a:t>MaxentClassifier.classify</a:t>
-            </a:r>
-            <a:r>
-              <a:rPr lang="en-US" altLang="ja-JP" dirty="0" smtClean="0"/>
-              <a:t>(</a:t>
-            </a:r>
-            <a:r>
-              <a:rPr lang="en-US" altLang="ja-JP" dirty="0" err="1" smtClean="0"/>
-              <a:t>test_features</a:t>
-            </a:r>
-            <a:r>
-              <a:rPr lang="en-US" altLang="ja-JP" dirty="0" smtClean="0"/>
-              <a:t>)</a:t>
-            </a:r>
-            <a:br>
-              <a:rPr lang="en-US" altLang="ja-JP" dirty="0" smtClean="0"/>
-            </a:br>
-            <a:r>
-              <a:rPr lang="en-US" altLang="ja-JP" dirty="0" smtClean="0"/>
-              <a:t>cm </a:t>
-            </a:r>
-            <a:r>
-              <a:rPr lang="en-US" altLang="ja-JP" dirty="0"/>
-              <a:t>= </a:t>
-            </a:r>
-            <a:r>
-              <a:rPr lang="en-US" altLang="ja-JP" dirty="0" err="1"/>
-              <a:t>nltk.ConfusionMatrix</a:t>
-            </a:r>
-            <a:r>
-              <a:rPr lang="en-US" altLang="ja-JP" dirty="0"/>
-              <a:t>(</a:t>
-            </a:r>
-            <a:r>
-              <a:rPr lang="en-US" altLang="ja-JP" dirty="0" err="1"/>
-              <a:t>gold_labels</a:t>
-            </a:r>
-            <a:r>
-              <a:rPr lang="en-US" altLang="ja-JP" dirty="0"/>
-              <a:t>, </a:t>
-            </a:r>
-            <a:r>
-              <a:rPr lang="en-US" altLang="ja-JP" dirty="0" err="1" smtClean="0"/>
-              <a:t>classifier_outputs</a:t>
-            </a:r>
-            <a:r>
-              <a:rPr lang="en-US" altLang="ja-JP" dirty="0" smtClean="0"/>
-              <a:t>)</a:t>
-            </a:r>
-            <a:br>
-              <a:rPr lang="en-US" altLang="ja-JP" dirty="0" smtClean="0"/>
-            </a:br>
-            <a:r>
-              <a:rPr lang="en-US" altLang="ja-JP" dirty="0" smtClean="0"/>
-              <a:t>print </a:t>
-            </a:r>
-            <a:r>
-              <a:rPr lang="en-US" altLang="ja-JP" dirty="0"/>
-              <a:t>cm</a:t>
-            </a:r>
+              <a:t>・</a:t>
+            </a:r>
+            <a:endParaRPr lang="ja-JP" altLang="en-US" dirty="0"/>
           </a:p>
         </p:txBody>
       </p:sp>
@@ -7026,7 +7952,7 @@
       </p:grpSpPr>
       <p:sp>
         <p:nvSpPr>
-          <p:cNvPr id="31745" name="Rectangle 1"/>
+          <p:cNvPr id="30721" name="Rectangle 1"/>
           <p:cNvSpPr>
             <a:spLocks noGrp="1" noChangeArrowheads="1"/>
           </p:cNvSpPr>
@@ -7043,17 +7969,20 @@
           <a:p>
             <a:r>
               <a:rPr lang="ja-JP" altLang="en-US" dirty="0"/>
-              <a:t>より</a:t>
-            </a:r>
-            <a:r>
-              <a:rPr lang="ja-JP" altLang="en-US" dirty="0" smtClean="0"/>
-              <a:t>良いモデルを求めて</a:t>
-            </a:r>
-            <a:r>
-              <a:rPr lang="en-US" altLang="ja-JP" dirty="0" smtClean="0"/>
-              <a:t>…</a:t>
-            </a:r>
-            <a:endParaRPr lang="ja-JP" altLang="en-US" dirty="0"/>
+              <a:t>評価</a:t>
+            </a:r>
+            <a:r>
+              <a:rPr lang="en-US" altLang="ja-JP" dirty="0"/>
+              <a:t>: </a:t>
+            </a:r>
+            <a:r>
+              <a:rPr lang="ja-JP" altLang="en-US" dirty="0"/>
+              <a:t>そのモデルで大丈夫</a:t>
+            </a:r>
+            <a:r>
+              <a:rPr lang="en-US" altLang="ja-JP" dirty="0"/>
+              <a:t>?</a:t>
+            </a:r>
           </a:p>
         </p:txBody>
       </p:sp>
@@ -7076,7 +8005,7 @@
           <a:bodyPr/>
           <a:lstStyle/>
           <a:p>
-            <a:fld id="{A51ECD0F-213E-4DC8-8B09-BB3C23AD1406}" type="slidenum">
+            <a:fld id="{A9D3CB40-E20B-49ED-91F9-0F8BA9CA454A}" type="slidenum">
               <a:rPr lang="en-US" altLang="ja-JP"/>
               <a:pPr/>
               <a:t>26</a:t>
@@ -7087,7 +8016,7 @@
       </p:sp>
       <p:sp>
         <p:nvSpPr>
-          <p:cNvPr id="31746" name="Rectangle 2"/>
+          <p:cNvPr id="30722" name="Rectangle 2"/>
           <p:cNvSpPr>
             <a:spLocks noGrp="1" noChangeArrowheads="1"/>
           </p:cNvSpPr>
@@ -7106,151 +8035,309 @@
               <a:tabLst>
                 <a:tab pos="1304925" algn="l"/>
                 <a:tab pos="2346325" algn="l"/>
+                <a:tab pos="1304925" algn="l"/>
+                <a:tab pos="2346325" algn="l"/>
+                <a:tab pos="1304925" algn="l"/>
+                <a:tab pos="2346325" algn="l"/>
               </a:tabLst>
             </a:pPr>
             <a:r>
+              <a:rPr lang="en-US" altLang="ja-JP" dirty="0" smtClean="0"/>
+              <a:t>Accuracy</a:t>
+            </a:r>
+            <a:r>
+              <a:rPr lang="ja-JP" altLang="en-US" dirty="0" smtClean="0"/>
+              <a:t>はどうでしたか？</a:t>
+            </a:r>
+            <a:endParaRPr lang="en-US" altLang="ja-JP" dirty="0" smtClean="0"/>
+          </a:p>
+          <a:p>
+            <a:pPr>
+              <a:tabLst>
+                <a:tab pos="1304925" algn="l"/>
+                <a:tab pos="2346325" algn="l"/>
+                <a:tab pos="1304925" algn="l"/>
+                <a:tab pos="2346325" algn="l"/>
+                <a:tab pos="1304925" algn="l"/>
+                <a:tab pos="2346325" algn="l"/>
+              </a:tabLst>
+            </a:pPr>
+            <a:r>
+              <a:rPr lang="en-US" altLang="ja-JP" dirty="0" err="1" smtClean="0"/>
+              <a:t>MaxentClassifier</a:t>
+            </a:r>
+            <a:r>
               <a:rPr lang="ja-JP" altLang="en-US" dirty="0"/>
-              <a:t>どの素性が精度に寄与しているのか</a:t>
+              <a:t>は多クラス分類器</a:t>
+            </a:r>
+          </a:p>
+          <a:p>
+            <a:pPr marL="842963" lvl="1">
+              <a:tabLst>
+                <a:tab pos="1304925" algn="l"/>
+                <a:tab pos="2346325" algn="l"/>
+                <a:tab pos="1304925" algn="l"/>
+                <a:tab pos="2346325" algn="l"/>
+                <a:tab pos="1304925" algn="l"/>
+                <a:tab pos="2346325" algn="l"/>
+              </a:tabLst>
+            </a:pPr>
+            <a:r>
+              <a:rPr lang="ja-JP" altLang="en-US" dirty="0"/>
+              <a:t>本当</a:t>
             </a:r>
             <a:r>
               <a:rPr lang="ja-JP" altLang="en-US" dirty="0" smtClean="0"/>
-              <a:t>調べたい</a:t>
+              <a:t>は </a:t>
+            </a:r>
+            <a:r>
+              <a:rPr lang="en-US" altLang="ja-JP" dirty="0" smtClean="0">
+                <a:latin typeface="Helvetica"/>
+              </a:rPr>
+              <a:t>“</a:t>
             </a:r>
             <a:r>
               <a:rPr lang="en-US" altLang="ja-JP" dirty="0" smtClean="0"/>
+              <a:t>at</a:t>
+            </a:r>
+            <a:r>
+              <a:rPr lang="en-US" altLang="ja-JP" dirty="0" smtClean="0">
+                <a:latin typeface="Helvetica"/>
+              </a:rPr>
+              <a:t>”</a:t>
+            </a:r>
+            <a:r>
+              <a:rPr lang="en-US" altLang="ja-JP" dirty="0" smtClean="0"/>
+              <a:t> </a:t>
+            </a:r>
+            <a:r>
+              <a:rPr lang="ja-JP" altLang="en-US" dirty="0" err="1" smtClean="0"/>
+              <a:t>だったのに</a:t>
+            </a:r>
+            <a:r>
+              <a:rPr lang="ja-JP" altLang="en-US" dirty="0">
+                <a:latin typeface="Helvetica"/>
+              </a:rPr>
+              <a:t> </a:t>
+            </a:r>
+            <a:r>
+              <a:rPr lang="en-US" altLang="ja-JP" dirty="0" smtClean="0">
+                <a:latin typeface="Helvetica"/>
+              </a:rPr>
+              <a:t>“</a:t>
+            </a:r>
+            <a:r>
+              <a:rPr lang="en-US" altLang="ja-JP" dirty="0" smtClean="0"/>
+              <a:t>in</a:t>
+            </a:r>
+            <a:r>
+              <a:rPr lang="en-US" altLang="ja-JP" dirty="0" smtClean="0">
+                <a:latin typeface="Helvetica"/>
+              </a:rPr>
+              <a:t>”</a:t>
+            </a:r>
+            <a:r>
+              <a:rPr lang="en-US" altLang="ja-JP" dirty="0" smtClean="0"/>
+              <a:t> </a:t>
+            </a:r>
+            <a:r>
+              <a:rPr lang="ja-JP" altLang="en-US" dirty="0"/>
+              <a:t>だと出力した場合</a:t>
+            </a:r>
+            <a:r>
+              <a:rPr lang="ja-JP" altLang="en-US" dirty="0" smtClean="0"/>
+              <a:t>と </a:t>
+            </a:r>
+            <a:r>
+              <a:rPr lang="en-US" altLang="ja-JP" dirty="0" smtClean="0">
+                <a:latin typeface="Helvetica"/>
+              </a:rPr>
+              <a:t>“</a:t>
+            </a:r>
+            <a:r>
+              <a:rPr lang="en-US" altLang="ja-JP" dirty="0" smtClean="0"/>
+              <a:t>on</a:t>
+            </a:r>
+            <a:r>
+              <a:rPr lang="en-US" altLang="ja-JP" dirty="0" smtClean="0">
+                <a:latin typeface="Helvetica"/>
+              </a:rPr>
+              <a:t>” </a:t>
+            </a:r>
+            <a:r>
+              <a:rPr lang="ja-JP" altLang="en-US" dirty="0" smtClean="0"/>
+              <a:t>だと</a:t>
+            </a:r>
+            <a:r>
+              <a:rPr lang="ja-JP" altLang="en-US" dirty="0"/>
+              <a:t>出力した場合はどちらが多いんだろう</a:t>
+            </a:r>
+            <a:r>
+              <a:rPr lang="en-US" altLang="ja-JP" dirty="0" smtClean="0">
+                <a:latin typeface="Helvetica"/>
+              </a:rPr>
               <a:t>…</a:t>
             </a:r>
-            <a:endParaRPr lang="ja-JP" altLang="en-US" dirty="0"/>
+            <a:endParaRPr lang="en-US" altLang="ja-JP" dirty="0"/>
+          </a:p>
+          <a:p>
+            <a:pPr marL="484188" lvl="2">
+              <a:tabLst>
+                <a:tab pos="1304925" algn="l"/>
+                <a:tab pos="2346325" algn="l"/>
+                <a:tab pos="1304925" algn="l"/>
+                <a:tab pos="2346325" algn="l"/>
+                <a:tab pos="1304925" algn="l"/>
+                <a:tab pos="2346325" algn="l"/>
+              </a:tabLst>
+            </a:pPr>
+            <a:r>
+              <a:rPr lang="en-US" altLang="ja-JP" b="0" dirty="0" smtClean="0"/>
+              <a:t>	</a:t>
+            </a:r>
+            <a:r>
+              <a:rPr lang="ja-JP" altLang="en-US" b="0" dirty="0" smtClean="0"/>
+              <a:t>分類器が間違いやすいケースを特定したい！</a:t>
+            </a:r>
+            <a:endParaRPr lang="ja-JP" altLang="en-US" b="0" dirty="0"/>
+          </a:p>
+          <a:p>
+            <a:pPr marL="842963" lvl="1">
+              <a:tabLst>
+                <a:tab pos="1304925" algn="l"/>
+                <a:tab pos="2346325" algn="l"/>
+                <a:tab pos="1304925" algn="l"/>
+                <a:tab pos="2346325" algn="l"/>
+                <a:tab pos="1304925" algn="l"/>
+                <a:tab pos="2346325" algn="l"/>
+              </a:tabLst>
+            </a:pPr>
+            <a:r>
+              <a:rPr lang="ja-JP" altLang="en-US" dirty="0"/>
+              <a:t>そこで混同行列</a:t>
+            </a:r>
+            <a:r>
+              <a:rPr lang="en-US" altLang="ja-JP" dirty="0"/>
+              <a:t>(Confusion Matrix</a:t>
+            </a:r>
+            <a:r>
+              <a:rPr lang="en-US" altLang="ja-JP" dirty="0" smtClean="0"/>
+              <a:t>)</a:t>
+            </a:r>
+            <a:r>
+              <a:rPr lang="ja-JP" altLang="en-US" dirty="0" smtClean="0"/>
+              <a:t>！</a:t>
+            </a:r>
+            <a:endParaRPr lang="en-US" altLang="ja-JP" dirty="0"/>
           </a:p>
           <a:p>
             <a:pPr marL="525463" lvl="2">
               <a:tabLst>
                 <a:tab pos="1304925" algn="l"/>
                 <a:tab pos="2346325" algn="l"/>
-              </a:tabLst>
-            </a:pPr>
-            <a:r>
-              <a:rPr lang="en-US" altLang="ja-JP" sz="2400" dirty="0" smtClean="0"/>
-              <a:t>print </a:t>
-            </a:r>
-            <a:r>
-              <a:rPr lang="en-US" altLang="ja-JP" sz="2400" dirty="0" err="1" smtClean="0"/>
-              <a:t>nltk.MaxentClassifier.show_most_informative_features</a:t>
-            </a:r>
-            <a:r>
-              <a:rPr lang="en-US" altLang="ja-JP" sz="2400" dirty="0" smtClean="0"/>
-              <a:t>(n </a:t>
-            </a:r>
-            <a:r>
-              <a:rPr lang="en-US" altLang="ja-JP" sz="2400" dirty="0"/>
-              <a:t>= 10</a:t>
-            </a:r>
-            <a:r>
-              <a:rPr lang="en-US" altLang="ja-JP" sz="2400" dirty="0" smtClean="0"/>
-              <a:t>)</a:t>
-            </a:r>
-          </a:p>
-          <a:p>
-            <a:pPr marL="842963" lvl="1">
-              <a:tabLst>
+                <a:tab pos="1304925" algn="l"/>
+                <a:tab pos="2346325" algn="l"/>
                 <a:tab pos="1304925" algn="l"/>
                 <a:tab pos="2346325" algn="l"/>
               </a:tabLst>
             </a:pPr>
             <a:r>
-              <a:rPr lang="ja-JP" altLang="en-US" dirty="0" smtClean="0"/>
-              <a:t>上位</a:t>
-            </a:r>
-            <a:r>
-              <a:rPr lang="en-US" altLang="ja-JP" dirty="0"/>
-              <a:t>10</a:t>
-            </a:r>
-            <a:r>
-              <a:rPr lang="ja-JP" altLang="en-US" dirty="0"/>
-              <a:t>個の素性とそのラベルが表示</a:t>
-            </a:r>
-            <a:r>
-              <a:rPr lang="ja-JP" altLang="en-US" dirty="0" smtClean="0"/>
-              <a:t>される</a:t>
-            </a:r>
-            <a:endParaRPr lang="en-US" altLang="ja-JP" dirty="0" smtClean="0"/>
-          </a:p>
-          <a:p>
-            <a:pPr marL="225425">
-              <a:tabLst>
-                <a:tab pos="1304925" algn="l"/>
-                <a:tab pos="2346325" algn="l"/>
-              </a:tabLst>
-            </a:pPr>
-            <a:r>
-              <a:rPr lang="ja-JP" altLang="en-US" dirty="0" smtClean="0"/>
-              <a:t>シンプルな素性では正しい文の特徴を捉えられないときがある</a:t>
-            </a:r>
-            <a:endParaRPr lang="en-US" altLang="ja-JP" dirty="0" smtClean="0"/>
-          </a:p>
-          <a:p>
-            <a:pPr marL="848225" lvl="1">
-              <a:tabLst>
-                <a:tab pos="1304925" algn="l"/>
-                <a:tab pos="2346325" algn="l"/>
-              </a:tabLst>
-            </a:pPr>
-            <a:r>
-              <a:rPr lang="ja-JP" altLang="en-US" dirty="0" smtClean="0"/>
-              <a:t>誤り事例や，元のコーパスをもう一度眺めてみる</a:t>
-            </a:r>
-            <a:r>
-              <a:rPr lang="en-US" altLang="ja-JP" dirty="0" smtClean="0"/>
-              <a:t>…</a:t>
-            </a:r>
-            <a:r>
-              <a:rPr lang="ja-JP" altLang="en-US" dirty="0" smtClean="0"/>
-              <a:t>そして考える</a:t>
-            </a:r>
-            <a:endParaRPr lang="en-US" altLang="ja-JP" dirty="0"/>
-          </a:p>
-          <a:p>
-            <a:pPr marL="848225" lvl="1">
-              <a:tabLst>
-                <a:tab pos="1304925" algn="l"/>
-                <a:tab pos="2346325" algn="l"/>
-              </a:tabLst>
-            </a:pPr>
-            <a:r>
-              <a:rPr lang="ja-JP" altLang="en-US" dirty="0"/>
-              <a:t>誤り</a:t>
-            </a:r>
-            <a:r>
-              <a:rPr lang="ja-JP" altLang="en-US" dirty="0" smtClean="0"/>
-              <a:t>の傾向を素性に取り込む必要があるのだろうか</a:t>
-            </a:r>
-            <a:endParaRPr lang="en-US" altLang="ja-JP" dirty="0" smtClean="0"/>
-          </a:p>
-          <a:p>
-            <a:pPr marL="848225" lvl="1">
-              <a:tabLst>
-                <a:tab pos="1304925" algn="l"/>
-                <a:tab pos="2346325" algn="l"/>
-              </a:tabLst>
-            </a:pPr>
-            <a:r>
-              <a:rPr lang="ja-JP" altLang="en-US" dirty="0" smtClean="0"/>
-              <a:t>単語の活用形ではなく，原形を入れてみてはどうだろうか</a:t>
-            </a:r>
-            <a:endParaRPr lang="en-US" altLang="ja-JP" dirty="0" smtClean="0"/>
-          </a:p>
-          <a:p>
-            <a:pPr marL="848225" lvl="1">
-              <a:tabLst>
-                <a:tab pos="1304925" algn="l"/>
-                <a:tab pos="2346325" algn="l"/>
-              </a:tabLst>
-            </a:pPr>
-            <a:r>
-              <a:rPr lang="ja-JP" altLang="en-US" dirty="0" smtClean="0"/>
-              <a:t>より広い範囲の構文的な情報を取り込むとどうなるだろうか</a:t>
-            </a:r>
-            <a:endParaRPr lang="en-US" altLang="ja-JP" dirty="0" smtClean="0"/>
+              <a:rPr lang="en-US" altLang="ja-JP" sz="2400" dirty="0" err="1" smtClean="0"/>
+              <a:t>classifier_outputs</a:t>
+            </a:r>
+            <a:r>
+              <a:rPr lang="en-US" altLang="ja-JP" sz="2400" dirty="0" smtClean="0"/>
+              <a:t> </a:t>
+            </a:r>
+            <a:r>
+              <a:rPr lang="en-US" altLang="ja-JP" sz="2400" dirty="0"/>
+              <a:t>= </a:t>
+            </a:r>
+            <a:r>
+              <a:rPr lang="en-US" altLang="ja-JP" sz="2400" dirty="0" smtClean="0"/>
+              <a:t/>
+            </a:r>
+            <a:br>
+              <a:rPr lang="en-US" altLang="ja-JP" sz="2400" dirty="0" smtClean="0"/>
+            </a:br>
+            <a:r>
+              <a:rPr lang="en-US" altLang="ja-JP" sz="2400" dirty="0" smtClean="0"/>
+              <a:t>	[</a:t>
+            </a:r>
+            <a:r>
+              <a:rPr lang="en-US" altLang="ja-JP" sz="2400" dirty="0" err="1" smtClean="0"/>
+              <a:t>nltk.MaxentClassifier.classify</a:t>
+            </a:r>
+            <a:r>
+              <a:rPr lang="en-US" altLang="ja-JP" sz="2400" dirty="0" smtClean="0"/>
+              <a:t>(t) </a:t>
+            </a:r>
+            <a:r>
+              <a:rPr lang="en-US" altLang="ja-JP" sz="2400" dirty="0"/>
+              <a:t>for </a:t>
+            </a:r>
+            <a:r>
+              <a:rPr lang="en-US" altLang="ja-JP" sz="2400" dirty="0" smtClean="0"/>
+              <a:t>t </a:t>
+            </a:r>
+            <a:r>
+              <a:rPr lang="en-US" altLang="ja-JP" sz="2400" dirty="0"/>
+              <a:t>in </a:t>
+            </a:r>
+            <a:r>
+              <a:rPr lang="en-US" altLang="ja-JP" sz="2400" dirty="0" err="1"/>
+              <a:t>testset_features</a:t>
+            </a:r>
+            <a:r>
+              <a:rPr lang="en-US" altLang="ja-JP" sz="2400" dirty="0" smtClean="0"/>
+              <a:t>]</a:t>
+            </a:r>
+            <a:br>
+              <a:rPr lang="en-US" altLang="ja-JP" sz="2400" dirty="0" smtClean="0"/>
+            </a:br>
+            <a:r>
+              <a:rPr lang="en-US" altLang="ja-JP" sz="2400" dirty="0" smtClean="0"/>
+              <a:t>cm </a:t>
+            </a:r>
+            <a:r>
+              <a:rPr lang="en-US" altLang="ja-JP" sz="2400" dirty="0"/>
+              <a:t>= </a:t>
+            </a:r>
+            <a:r>
+              <a:rPr lang="en-US" altLang="ja-JP" sz="2400" dirty="0" err="1"/>
+              <a:t>nltk.ConfusionMatrix</a:t>
+            </a:r>
+            <a:r>
+              <a:rPr lang="en-US" altLang="ja-JP" sz="2400" dirty="0"/>
+              <a:t>(</a:t>
+            </a:r>
+            <a:r>
+              <a:rPr lang="en-US" altLang="ja-JP" sz="2400" dirty="0" err="1"/>
+              <a:t>gold_labels</a:t>
+            </a:r>
+            <a:r>
+              <a:rPr lang="en-US" altLang="ja-JP" sz="2400" dirty="0"/>
+              <a:t>, </a:t>
+            </a:r>
+            <a:r>
+              <a:rPr lang="en-US" altLang="ja-JP" sz="2400" dirty="0" err="1" smtClean="0"/>
+              <a:t>classifier_outputs</a:t>
+            </a:r>
+            <a:r>
+              <a:rPr lang="en-US" altLang="ja-JP" sz="2400" dirty="0" smtClean="0"/>
+              <a:t>)</a:t>
+            </a:r>
+            <a:br>
+              <a:rPr lang="en-US" altLang="ja-JP" sz="2400" dirty="0" smtClean="0"/>
+            </a:br>
+            <a:r>
+              <a:rPr lang="en-US" altLang="ja-JP" sz="2400" dirty="0" smtClean="0"/>
+              <a:t>print </a:t>
+            </a:r>
+            <a:r>
+              <a:rPr lang="en-US" altLang="ja-JP" sz="2400" dirty="0"/>
+              <a:t>cm</a:t>
+            </a:r>
           </a:p>
         </p:txBody>
       </p:sp>
@@ -7289,6 +8376,285 @@
       </p:grpSpPr>
       <p:sp>
         <p:nvSpPr>
+          <p:cNvPr id="31745" name="Rectangle 1"/>
+          <p:cNvSpPr>
+            <a:spLocks noGrp="1" noChangeArrowheads="1"/>
+          </p:cNvSpPr>
+          <p:nvPr>
+            <p:ph type="title"/>
+          </p:nvPr>
+        </p:nvSpPr>
+        <p:spPr>
+          <a:ln/>
+        </p:spPr>
+        <p:txBody>
+          <a:bodyPr/>
+          <a:lstStyle/>
+          <a:p>
+            <a:r>
+              <a:rPr lang="ja-JP" altLang="en-US" dirty="0"/>
+              <a:t>より</a:t>
+            </a:r>
+            <a:r>
+              <a:rPr lang="ja-JP" altLang="en-US" dirty="0" smtClean="0"/>
+              <a:t>良いモデルを求めて</a:t>
+            </a:r>
+            <a:r>
+              <a:rPr lang="en-US" altLang="ja-JP" dirty="0" smtClean="0"/>
+              <a:t>…</a:t>
+            </a:r>
+            <a:endParaRPr lang="ja-JP" altLang="en-US" dirty="0"/>
+          </a:p>
+        </p:txBody>
+      </p:sp>
+      <p:sp>
+        <p:nvSpPr>
+          <p:cNvPr id="4" name="Slide Number Placeholder 3"/>
+          <p:cNvSpPr>
+            <a:spLocks noGrp="1"/>
+          </p:cNvSpPr>
+          <p:nvPr>
+            <p:ph type="sldNum" sz="quarter" idx="4"/>
+          </p:nvPr>
+        </p:nvSpPr>
+        <p:spPr>
+          <a:prstGeom prst="rect">
+            <a:avLst/>
+          </a:prstGeom>
+        </p:spPr>
+        <p:txBody>
+          <a:bodyPr/>
+          <a:lstStyle/>
+          <a:p>
+            <a:fld id="{A51ECD0F-213E-4DC8-8B09-BB3C23AD1406}" type="slidenum">
+              <a:rPr lang="en-US" altLang="ja-JP"/>
+              <a:pPr/>
+              <a:t>27</a:t>
+            </a:fld>
+            <a:endParaRPr lang="en-US" altLang="ja-JP"/>
+          </a:p>
+        </p:txBody>
+      </p:sp>
+      <p:sp>
+        <p:nvSpPr>
+          <p:cNvPr id="31746" name="Rectangle 2"/>
+          <p:cNvSpPr>
+            <a:spLocks noGrp="1" noChangeArrowheads="1"/>
+          </p:cNvSpPr>
+          <p:nvPr>
+            <p:ph sz="quarter" idx="10"/>
+          </p:nvPr>
+        </p:nvSpPr>
+        <p:spPr>
+          <a:ln/>
+        </p:spPr>
+        <p:txBody>
+          <a:bodyPr/>
+          <a:lstStyle/>
+          <a:p>
+            <a:pPr>
+              <a:tabLst>
+                <a:tab pos="1304925" algn="l"/>
+                <a:tab pos="2346325" algn="l"/>
+              </a:tabLst>
+            </a:pPr>
+            <a:r>
+              <a:rPr lang="ja-JP" altLang="en-US" dirty="0"/>
+              <a:t>どの素性が精度に寄与しているのか</a:t>
+            </a:r>
+            <a:r>
+              <a:rPr lang="ja-JP" altLang="en-US" dirty="0" smtClean="0"/>
+              <a:t>調べたい</a:t>
+            </a:r>
+            <a:r>
+              <a:rPr lang="en-US" altLang="ja-JP" dirty="0" smtClean="0"/>
+              <a:t>…</a:t>
+            </a:r>
+            <a:endParaRPr lang="ja-JP" altLang="en-US" dirty="0"/>
+          </a:p>
+          <a:p>
+            <a:pPr marL="525463" lvl="2">
+              <a:tabLst>
+                <a:tab pos="1304925" algn="l"/>
+                <a:tab pos="2346325" algn="l"/>
+              </a:tabLst>
+            </a:pPr>
+            <a:r>
+              <a:rPr lang="en-US" altLang="ja-JP" sz="2400" dirty="0" smtClean="0"/>
+              <a:t>print </a:t>
+            </a:r>
+            <a:r>
+              <a:rPr lang="en-US" altLang="ja-JP" sz="2400" dirty="0" err="1" smtClean="0"/>
+              <a:t>nltk.MaxentClassifier.show_most_informative_features</a:t>
+            </a:r>
+            <a:r>
+              <a:rPr lang="en-US" altLang="ja-JP" sz="2400" dirty="0" smtClean="0"/>
+              <a:t>(n </a:t>
+            </a:r>
+            <a:r>
+              <a:rPr lang="en-US" altLang="ja-JP" sz="2400" dirty="0"/>
+              <a:t>= 10</a:t>
+            </a:r>
+            <a:r>
+              <a:rPr lang="en-US" altLang="ja-JP" sz="2400" dirty="0" smtClean="0"/>
+              <a:t>)</a:t>
+            </a:r>
+          </a:p>
+          <a:p>
+            <a:pPr marL="842963" lvl="1">
+              <a:tabLst>
+                <a:tab pos="1304925" algn="l"/>
+                <a:tab pos="2346325" algn="l"/>
+              </a:tabLst>
+            </a:pPr>
+            <a:r>
+              <a:rPr lang="ja-JP" altLang="en-US" dirty="0" smtClean="0"/>
+              <a:t>上位</a:t>
+            </a:r>
+            <a:r>
+              <a:rPr lang="en-US" altLang="ja-JP" dirty="0"/>
+              <a:t>10</a:t>
+            </a:r>
+            <a:r>
+              <a:rPr lang="ja-JP" altLang="en-US" dirty="0"/>
+              <a:t>個の素性とそのラベルが表示</a:t>
+            </a:r>
+            <a:r>
+              <a:rPr lang="ja-JP" altLang="en-US" dirty="0" smtClean="0"/>
+              <a:t>される</a:t>
+            </a:r>
+            <a:endParaRPr lang="en-US" altLang="ja-JP" dirty="0" smtClean="0"/>
+          </a:p>
+          <a:p>
+            <a:pPr marL="225425">
+              <a:tabLst>
+                <a:tab pos="1304925" algn="l"/>
+                <a:tab pos="2346325" algn="l"/>
+              </a:tabLst>
+            </a:pPr>
+            <a:r>
+              <a:rPr lang="ja-JP" altLang="en-US" dirty="0" smtClean="0"/>
+              <a:t>シンプルな素性では正しい文の特徴を捉えられないときがある</a:t>
+            </a:r>
+            <a:endParaRPr lang="en-US" altLang="ja-JP" dirty="0" smtClean="0"/>
+          </a:p>
+          <a:p>
+            <a:pPr marL="848225" lvl="1">
+              <a:tabLst>
+                <a:tab pos="1304925" algn="l"/>
+                <a:tab pos="2346325" algn="l"/>
+              </a:tabLst>
+            </a:pPr>
+            <a:r>
+              <a:rPr lang="ja-JP" altLang="en-US" dirty="0" smtClean="0"/>
+              <a:t>誤り事例や，元のコーパスをもう一度眺めてみる</a:t>
+            </a:r>
+            <a:r>
+              <a:rPr lang="en-US" altLang="ja-JP" dirty="0" smtClean="0"/>
+              <a:t>…</a:t>
+            </a:r>
+            <a:r>
+              <a:rPr lang="ja-JP" altLang="en-US" dirty="0" smtClean="0"/>
+              <a:t>そして</a:t>
+            </a:r>
+            <a:r>
+              <a:rPr lang="ja-JP" altLang="en-US" dirty="0" smtClean="0"/>
+              <a:t>考える</a:t>
+            </a:r>
+            <a:endParaRPr lang="en-US" altLang="ja-JP" dirty="0" smtClean="0"/>
+          </a:p>
+          <a:p>
+            <a:pPr marL="848225" lvl="1">
+              <a:tabLst>
+                <a:tab pos="1304925" algn="l"/>
+                <a:tab pos="2346325" algn="l"/>
+              </a:tabLst>
+            </a:pPr>
+            <a:r>
+              <a:rPr lang="ja-JP" altLang="en-US" dirty="0" smtClean="0"/>
+              <a:t>単語の活用形ではなく，原形を入れてみてはどうだろうか</a:t>
+            </a:r>
+            <a:endParaRPr lang="en-US" altLang="ja-JP" dirty="0" smtClean="0"/>
+          </a:p>
+          <a:p>
+            <a:pPr marL="848225" lvl="1">
+              <a:tabLst>
+                <a:tab pos="1304925" algn="l"/>
+                <a:tab pos="2346325" algn="l"/>
+              </a:tabLst>
+            </a:pPr>
+            <a:r>
+              <a:rPr lang="ja-JP" altLang="en-US" dirty="0" smtClean="0"/>
+              <a:t>より広い範囲の構文的な情報を取り込むとどうなるだろう</a:t>
+            </a:r>
+            <a:r>
+              <a:rPr lang="ja-JP" altLang="en-US" dirty="0" smtClean="0"/>
+              <a:t>か</a:t>
+            </a:r>
+            <a:endParaRPr lang="en-US" altLang="ja-JP" dirty="0" smtClean="0"/>
+          </a:p>
+          <a:p>
+            <a:pPr marL="848225" lvl="1">
+              <a:tabLst>
+                <a:tab pos="1304925" algn="l"/>
+                <a:tab pos="2346325" algn="l"/>
+              </a:tabLst>
+            </a:pPr>
+            <a:r>
+              <a:rPr lang="ja-JP" altLang="en-US" dirty="0"/>
+              <a:t>誤りの</a:t>
+            </a:r>
+            <a:r>
+              <a:rPr lang="ja-JP" altLang="en-US" dirty="0" smtClean="0"/>
+              <a:t>傾向は？素性</a:t>
+            </a:r>
+            <a:r>
+              <a:rPr lang="ja-JP" altLang="en-US" dirty="0"/>
+              <a:t>に</a:t>
+            </a:r>
+            <a:r>
+              <a:rPr lang="ja-JP" altLang="en-US" dirty="0" smtClean="0"/>
+              <a:t>取り込むにはどうするか・・・</a:t>
+            </a:r>
+            <a:endParaRPr lang="en-US" altLang="ja-JP" dirty="0" smtClean="0"/>
+          </a:p>
+        </p:txBody>
+      </p:sp>
+    </p:spTree>
+  </p:cSld>
+  <p:clrMapOvr>
+    <a:masterClrMapping/>
+  </p:clrMapOvr>
+  <p:transition/>
+  <p:timing>
+    <p:tnLst>
+      <p:par>
+        <p:cTn id="1" dur="indefinite" restart="never" nodeType="tmRoot"/>
+      </p:par>
+    </p:tnLst>
+  </p:timing>
+</p:sld>
+</file>
+
+<file path=ppt/slides/slide28.xml><?xml version="1.0" encoding="utf-8"?>
+<p:sld xmlns:a="http://schemas.openxmlformats.org/drawingml/2006/main" xmlns:r="http://schemas.openxmlformats.org/officeDocument/2006/relationships" xmlns:p="http://schemas.openxmlformats.org/presentationml/2006/main">
+  <p:cSld>
+    <p:spTree>
+      <p:nvGrpSpPr>
+        <p:cNvPr id="1" name=""/>
+        <p:cNvGrpSpPr/>
+        <p:nvPr/>
+      </p:nvGrpSpPr>
+      <p:grpSpPr>
+        <a:xfrm>
+          <a:off x="0" y="0"/>
+          <a:ext cx="0" cy="0"/>
+          <a:chOff x="0" y="0"/>
+          <a:chExt cx="0" cy="0"/>
+        </a:xfrm>
+      </p:grpSpPr>
+      <p:sp>
+        <p:nvSpPr>
           <p:cNvPr id="2" name="Title 1"/>
           <p:cNvSpPr>
             <a:spLocks noGrp="1"/>
@@ -7304,7 +8670,7 @@
           <a:p>
             <a:r>
               <a:rPr kumimoji="1" lang="ja-JP" altLang="en-US" dirty="0" smtClean="0"/>
-              <a:t>おわり</a:t>
+              <a:t>おつかれさまでした！</a:t>
             </a:r>
             <a:endParaRPr kumimoji="1" lang="ja-JP" altLang="en-US" dirty="0"/>
           </a:p>
@@ -7312,7 +8678,7 @@
       </p:sp>
       <p:sp>
         <p:nvSpPr>
-          <p:cNvPr id="3" name="Text Placeholder 2"/>
+          <p:cNvPr id="4" name="Text Placeholder 3"/>
           <p:cNvSpPr>
             <a:spLocks noGrp="1"/>
           </p:cNvSpPr>
@@ -7325,7 +8691,96 @@
           <a:bodyPr/>
           <a:lstStyle/>
           <a:p>
+            <a:r>
+              <a:rPr kumimoji="1" lang="ja-JP" altLang="en-US" dirty="0" smtClean="0"/>
+              <a:t>また会う日まで・・・</a:t>
+            </a:r>
             <a:endParaRPr kumimoji="1" lang="ja-JP" altLang="en-US" dirty="0"/>
+          </a:p>
+        </p:txBody>
+      </p:sp>
+      <p:pic>
+        <p:nvPicPr>
+          <p:cNvPr id="2050" name="Picture 2" descr="C:\Users\tuxedocat\Downloads\3505514132_4603ba56df_o.jpg"/>
+          <p:cNvPicPr>
+            <a:picLocks noChangeAspect="1" noChangeArrowheads="1"/>
+          </p:cNvPicPr>
+          <p:nvPr/>
+        </p:nvPicPr>
+        <p:blipFill rotWithShape="1">
+          <a:blip r:embed="rId2">
+            <a:extLst>
+              <a:ext uri="{28A0092B-C50C-407E-A947-70E740481C1C}">
+                <a14:useLocalDpi xmlns:a14="http://schemas.microsoft.com/office/drawing/2010/main" val="0"/>
+              </a:ext>
+            </a:extLst>
+          </a:blip>
+          <a:srcRect t="23153" r="932"/>
+          <a:stretch/>
+        </p:blipFill>
+        <p:spPr bwMode="auto">
+          <a:xfrm>
+            <a:off x="0" y="0"/>
+            <a:ext cx="13004800" cy="7521543"/>
+          </a:xfrm>
+          <a:prstGeom prst="rect">
+            <a:avLst/>
+          </a:prstGeom>
+          <a:noFill/>
+          <a:extLst>
+            <a:ext uri="{909E8E84-426E-40DD-AFC4-6F175D3DCCD1}">
+              <a14:hiddenFill xmlns:a14="http://schemas.microsoft.com/office/drawing/2010/main">
+                <a:solidFill>
+                  <a:srgbClr val="FFFFFF"/>
+                </a:solidFill>
+              </a14:hiddenFill>
+            </a:ext>
+          </a:extLst>
+        </p:spPr>
+      </p:pic>
+      <p:sp>
+        <p:nvSpPr>
+          <p:cNvPr id="5" name="TextBox 4"/>
+          <p:cNvSpPr txBox="1"/>
+          <p:nvPr/>
+        </p:nvSpPr>
+        <p:spPr>
+          <a:xfrm>
+            <a:off x="6358384" y="3815264"/>
+            <a:ext cx="6408712" cy="738664"/>
+          </a:xfrm>
+          <a:prstGeom prst="rect">
+            <a:avLst/>
+          </a:prstGeom>
+          <a:noFill/>
+        </p:spPr>
+        <p:txBody>
+          <a:bodyPr wrap="square" rtlCol="0">
+            <a:spAutoFit/>
+          </a:bodyPr>
+          <a:lstStyle/>
+          <a:p>
+            <a:r>
+              <a:rPr kumimoji="1" lang="en-US" altLang="ja-JP" dirty="0" smtClean="0">
+                <a:solidFill>
+                  <a:schemeClr val="bg1">
+                    <a:lumMod val="95000"/>
+                  </a:schemeClr>
+                </a:solidFill>
+                <a:latin typeface="Consolas Bold" pitchFamily="49" charset="0"/>
+                <a:cs typeface="Consolas Bold" pitchFamily="49" charset="0"/>
+              </a:rPr>
+              <a:t>Congratulations!!</a:t>
+            </a:r>
+            <a:endParaRPr kumimoji="1" lang="ja-JP" altLang="en-US" dirty="0">
+              <a:solidFill>
+                <a:schemeClr val="bg1">
+                  <a:lumMod val="95000"/>
+                </a:schemeClr>
+              </a:solidFill>
+              <a:latin typeface="Consolas Bold" pitchFamily="49" charset="0"/>
+              <a:cs typeface="Consolas Bold" pitchFamily="49" charset="0"/>
+            </a:endParaRPr>
           </a:p>
         </p:txBody>
       </p:sp>
@@ -9153,4 +10608,289 @@
     </a:extraClrScheme>
   </a:extraClrSchemeLst>
 </a:theme>
+</file>
+
+<file path=ppt/theme/theme2.xml><?xml version="1.0" encoding="utf-8"?>
+<a:theme xmlns:a="http://schemas.openxmlformats.org/drawingml/2006/main" name="Office Theme">
+  <a:themeElements>
+    <a:clrScheme name="Office">
+      <a:dk1>
+        <a:sysClr val="windowText" lastClr="000000"/>
+      </a:dk1>
+      <a:lt1>
+        <a:sysClr val="window" lastClr="FFFFFF"/>
+      </a:lt1>
+      <a:dk2>
+        <a:srgbClr val="1F497D"/>
+      </a:dk2>
+      <a:lt2>
+        <a:srgbClr val="EEECE1"/>
+      </a:lt2>
+      <a:accent1>
+        <a:srgbClr val="4F81BD"/>
+      </a:accent1>
+      <a:accent2>
+        <a:srgbClr val="C0504D"/>
+      </a:accent2>
+      <a:accent3>
+        <a:srgbClr val="9BBB59"/>
+      </a:accent3>
+      <a:accent4>
+        <a:srgbClr val="8064A2"/>
+      </a:accent4>
+      <a:accent5>
+        <a:srgbClr val="4BACC6"/>
+      </a:accent5>
+      <a:accent6>
+        <a:srgbClr val="F79646"/>
+      </a:accent6>
+      <a:hlink>
+        <a:srgbClr val="0000FF"/>
+      </a:hlink>
+      <a:folHlink>
+        <a:srgbClr val="800080"/>
+      </a:folHlink>
+    </a:clrScheme>
+    <a:fontScheme name="Office">
+      <a:majorFont>
+        <a:latin typeface="Calibri"/>
+        <a:ea typeface=""/>
+        <a:cs typeface=""/>
+        <a:font script="Jpan" typeface="ＭＳ Ｐゴシック"/>
+        <a:font script="Hang" typeface="맑은 고딕"/>
+        <a:font script="Hans" typeface="宋体"/>
+        <a:font script="Hant" typeface="新細明體"/>
+        <a:font script="Arab" typeface="Times New Roman"/>
+        <a:font script="Hebr" typeface="Times New Roman"/>
+        <a:font script="Thai" typeface="Angsana New"/>
+        <a:font script="Ethi" typeface="Nyala"/>
+        <a:font script="Beng" typeface="Vrinda"/>
+        <a:font script="Gujr" typeface="Shruti"/>
+        <a:font script="Khmr" typeface="MoolBoran"/>
+        <a:font script="Knda" typeface="Tunga"/>
+        <a:font script="Guru" typeface="Raavi"/>
+        <a:font script="Cans" typeface="Euphemia"/>
+        <a:font script="Cher" typeface="Plantagenet Cherokee"/>
+        <a:font script="Yiii" typeface="Microsoft Yi Baiti"/>
+        <a:font script="Tibt" typeface="Microsoft Himalaya"/>
+        <a:font script="Thaa" typeface="MV Boli"/>
+        <a:font script="Deva" typeface="Mangal"/>
+        <a:font script="Telu" typeface="Gautami"/>
+        <a:font script="Taml" typeface="Latha"/>
+        <a:font script="Syrc" typeface="Estrangelo Edessa"/>
+        <a:font script="Orya" typeface="Kalinga"/>
+        <a:font script="Mlym" typeface="Kartika"/>
+        <a:font script="Laoo" typeface="DokChampa"/>
+        <a:font script="Sinh" typeface="Iskoola Pota"/>
+        <a:font script="Mong" typeface="Mongolian Baiti"/>
+        <a:font script="Viet" typeface="Times New Roman"/>
+        <a:font script="Uigh" typeface="Microsoft Uighur"/>
+        <a:font script="Geor" typeface="Sylfaen"/>
+      </a:majorFont>
+      <a:minorFont>
+        <a:latin typeface="Calibri"/>
+        <a:ea typeface=""/>
+        <a:cs typeface=""/>
+        <a:font script="Jpan" typeface="ＭＳ Ｐゴシック"/>
+        <a:font script="Hang" typeface="맑은 고딕"/>
+        <a:font script="Hans" typeface="宋体"/>
+        <a:font script="Hant" typeface="新細明體"/>
+        <a:font script="Arab" typeface="Arial"/>
+        <a:font script="Hebr" typeface="Arial"/>
+        <a:font script="Thai" typeface="Cordia New"/>
+        <a:font script="Ethi" typeface="Nyala"/>
+        <a:font script="Beng" typeface="Vrinda"/>
+        <a:font script="Gujr" typeface="Shruti"/>
+        <a:font script="Khmr" typeface="DaunPenh"/>
+        <a:font script="Knda" typeface="Tunga"/>
+        <a:font script="Guru" typeface="Raavi"/>
+        <a:font script="Cans" typeface="Euphemia"/>
+        <a:font script="Cher" typeface="Plantagenet Cherokee"/>
+        <a:font script="Yiii" typeface="Microsoft Yi Baiti"/>
+        <a:font script="Tibt" typeface="Microsoft Himalaya"/>
+        <a:font script="Thaa" typeface="MV Boli"/>
+        <a:font script="Deva" typeface="Mangal"/>
+        <a:font script="Telu" typeface="Gautami"/>
+        <a:font script="Taml" typeface="Latha"/>
+        <a:font script="Syrc" typeface="Estrangelo Edessa"/>
+        <a:font script="Orya" typeface="Kalinga"/>
+        <a:font script="Mlym" typeface="Kartika"/>
+        <a:font script="Laoo" typeface="DokChampa"/>
+        <a:font script="Sinh" typeface="Iskoola Pota"/>
+        <a:font script="Mong" typeface="Mongolian Baiti"/>
+        <a:font script="Viet" typeface="Arial"/>
+        <a:font script="Uigh" typeface="Microsoft Uighur"/>
+        <a:font script="Geor" typeface="Sylfaen"/>
+      </a:minorFont>
+    </a:fontScheme>
+    <a:fmtScheme name="Office">
+      <a:fillStyleLst>
+        <a:solidFill>
+          <a:schemeClr val="phClr"/>
+        </a:solidFill>
+        <a:gradFill rotWithShape="1">
+          <a:gsLst>
+            <a:gs pos="0">
+              <a:schemeClr val="phClr">
+                <a:tint val="50000"/>
+                <a:satMod val="300000"/>
+              </a:schemeClr>
+            </a:gs>
+            <a:gs pos="35000">
+              <a:schemeClr val="phClr">
+                <a:tint val="37000"/>
+                <a:satMod val="300000"/>
+              </a:schemeClr>
+            </a:gs>
+            <a:gs pos="100000">
+              <a:schemeClr val="phClr">
+                <a:tint val="15000"/>
+                <a:satMod val="350000"/>
+              </a:schemeClr>
+            </a:gs>
+          </a:gsLst>
+          <a:lin ang="16200000" scaled="1"/>
+        </a:gradFill>
+        <a:gradFill rotWithShape="1">
+          <a:gsLst>
+            <a:gs pos="0">
+              <a:schemeClr val="phClr">
+                <a:shade val="51000"/>
+                <a:satMod val="130000"/>
+              </a:schemeClr>
+            </a:gs>
+            <a:gs pos="80000">
+              <a:schemeClr val="phClr">
+                <a:shade val="93000"/>
+                <a:satMod val="130000"/>
+              </a:schemeClr>
+            </a:gs>
+            <a:gs pos="100000">
+              <a:schemeClr val="phClr">
+                <a:shade val="94000"/>
+                <a:satMod val="135000"/>
+              </a:schemeClr>
+            </a:gs>
+          </a:gsLst>
+          <a:lin ang="16200000" scaled="0"/>
+        </a:gradFill>
+      </a:fillStyleLst>
+      <a:lnStyleLst>
+        <a:ln w="9525" cap="flat" cmpd="sng" algn="ctr">
+          <a:solidFill>
+            <a:schemeClr val="phClr">
+              <a:shade val="95000"/>
+              <a:satMod val="105000"/>
+            </a:schemeClr>
+          </a:solidFill>
+          <a:prstDash val="solid"/>
+        </a:ln>
+        <a:ln w="25400" cap="flat" cmpd="sng" algn="ctr">
+          <a:solidFill>
+            <a:schemeClr val="phClr"/>
+          </a:solidFill>
+          <a:prstDash val="solid"/>
+        </a:ln>
+        <a:ln w="38100" cap="flat" cmpd="sng" algn="ctr">
+          <a:solidFill>
+            <a:schemeClr val="phClr"/>
+          </a:solidFill>
+          <a:prstDash val="solid"/>
+        </a:ln>
+      </a:lnStyleLst>
+      <a:effectStyleLst>
+        <a:effectStyle>
+          <a:effectLst>
+            <a:outerShdw blurRad="40000" dist="20000" dir="5400000" rotWithShape="0">
+              <a:srgbClr val="000000">
+                <a:alpha val="38000"/>
+              </a:srgbClr>
+            </a:outerShdw>
+          </a:effectLst>
+        </a:effectStyle>
+        <a:effectStyle>
+          <a:effectLst>
+            <a:outerShdw blurRad="40000" dist="23000" dir="5400000" rotWithShape="0">
+              <a:srgbClr val="000000">
+                <a:alpha val="35000"/>
+              </a:srgbClr>
+            </a:outerShdw>
+          </a:effectLst>
+        </a:effectStyle>
+        <a:effectStyle>
+          <a:effectLst>
+            <a:outerShdw blurRad="40000" dist="23000" dir="5400000" rotWithShape="0">
+              <a:srgbClr val="000000">
+                <a:alpha val="35000"/>
+              </a:srgbClr>
+            </a:outerShdw>
+          </a:effectLst>
+          <a:scene3d>
+            <a:camera prst="orthographicFront">
+              <a:rot lat="0" lon="0" rev="0"/>
+            </a:camera>
+            <a:lightRig rig="threePt" dir="t">
+              <a:rot lat="0" lon="0" rev="1200000"/>
+            </a:lightRig>
+          </a:scene3d>
+          <a:sp3d>
+            <a:bevelT w="63500" h="25400"/>
+          </a:sp3d>
+        </a:effectStyle>
+      </a:effectStyleLst>
+      <a:bgFillStyleLst>
+        <a:solidFill>
+          <a:schemeClr val="phClr"/>
+        </a:solidFill>
+        <a:gradFill rotWithShape="1">
+          <a:gsLst>
+            <a:gs pos="0">
+              <a:schemeClr val="phClr">
+                <a:tint val="40000"/>
+                <a:satMod val="350000"/>
+              </a:schemeClr>
+            </a:gs>
+            <a:gs pos="40000">
+              <a:schemeClr val="phClr">
+                <a:tint val="45000"/>
+                <a:shade val="99000"/>
+                <a:satMod val="350000"/>
+              </a:schemeClr>
+            </a:gs>
+            <a:gs pos="100000">
+              <a:schemeClr val="phClr">
+                <a:shade val="20000"/>
+                <a:satMod val="255000"/>
+              </a:schemeClr>
+            </a:gs>
+          </a:gsLst>
+          <a:path path="circle">
+            <a:fillToRect l="50000" t="-80000" r="50000" b="180000"/>
+          </a:path>
+        </a:gradFill>
+        <a:gradFill rotWithShape="1">
+          <a:gsLst>
+            <a:gs pos="0">
+              <a:schemeClr val="phClr">
+                <a:tint val="80000"/>
+                <a:satMod val="300000"/>
+              </a:schemeClr>
+            </a:gs>
+            <a:gs pos="100000">
+              <a:schemeClr val="phClr">
+                <a:shade val="30000"/>
+                <a:satMod val="200000"/>
+              </a:schemeClr>
+            </a:gs>
+          </a:gsLst>
+          <a:path path="circle">
+            <a:fillToRect l="50000" t="50000" r="50000" b="50000"/>
+          </a:path>
+        </a:gradFill>
+      </a:bgFillStyleLst>
+    </a:fmtScheme>
+  </a:themeElements>
+  <a:objectDefaults/>
+  <a:extraClrSchemeLst/>
+</a:theme>
 </file>
</xml_diff>

<commit_message>
modified:   ss2012_slide.pdf 	modified:   ss2012_slide.pptx 	modified:   ss2012_slide_meister.pptx
</commit_message>
<xml_diff>
--- a/ss2012_slide.pptx
+++ b/ss2012_slide.pptx
@@ -2866,11 +2866,7 @@
             </a:r>
             <a:r>
               <a:rPr kumimoji="1" lang="ja-JP" altLang="en-US" dirty="0" smtClean="0"/>
-              <a:t>されたことを聞く度に、この仕事をしていてよかったと感じるんです。</a:t>
-            </a:r>
-            <a:r>
-              <a:rPr kumimoji="1" lang="ja-JP" altLang="en-US" dirty="0" smtClean="0"/>
-              <a:t>」</a:t>
+              <a:t>されたことを聞く度に、この仕事をしていてよかったと感じるんです。」</a:t>
             </a:r>
             <a:endParaRPr kumimoji="1" lang="en-US" altLang="ja-JP" dirty="0" smtClean="0"/>
           </a:p>
@@ -3610,11 +3606,7 @@
           <a:p>
             <a:r>
               <a:rPr lang="ja-JP" altLang="en-US" dirty="0" smtClean="0"/>
-              <a:t>最大</a:t>
-            </a:r>
-            <a:r>
-              <a:rPr lang="ja-JP" altLang="en-US" dirty="0" smtClean="0"/>
-              <a:t>エントロピー法：概略</a:t>
+              <a:t>最大エントロピー法：概略</a:t>
             </a:r>
             <a:endParaRPr lang="ja-JP" altLang="en-US" dirty="0"/>
           </a:p>
@@ -3986,11 +3978,7 @@
           <a:p>
             <a:r>
               <a:rPr kumimoji="1" lang="ja-JP" altLang="en-US" dirty="0" smtClean="0"/>
-              <a:t>最大</a:t>
-            </a:r>
-            <a:r>
-              <a:rPr kumimoji="1" lang="ja-JP" altLang="en-US" dirty="0" smtClean="0"/>
-              <a:t>エントロピー法：例題</a:t>
+              <a:t>最大エントロピー法：例題</a:t>
             </a:r>
             <a:endParaRPr kumimoji="1" lang="ja-JP" altLang="en-US" dirty="0"/>
           </a:p>
@@ -4265,11 +4253,7 @@
           <a:p>
             <a:r>
               <a:rPr kumimoji="1" lang="ja-JP" altLang="en-US" dirty="0" smtClean="0"/>
-              <a:t>最大</a:t>
-            </a:r>
-            <a:r>
-              <a:rPr kumimoji="1" lang="ja-JP" altLang="en-US" dirty="0" smtClean="0"/>
-              <a:t>エントロピー法：例題</a:t>
+              <a:t>最大エントロピー法：例題</a:t>
             </a:r>
             <a:endParaRPr kumimoji="1" lang="ja-JP" altLang="en-US" dirty="0"/>
           </a:p>
@@ -4315,7 +4299,15 @@
             </a:r>
             <a:r>
               <a:rPr kumimoji="1" lang="ja-JP" altLang="en-US" dirty="0" smtClean="0"/>
-              <a:t>ベクトルとそのラベル</a:t>
+              <a:t>ベクトル</a:t>
+            </a:r>
+            <a:r>
+              <a:rPr kumimoji="1" lang="en-US" altLang="ja-JP" b="1" dirty="0" smtClean="0"/>
+              <a:t>x</a:t>
+            </a:r>
+            <a:r>
+              <a:rPr kumimoji="1" lang="ja-JP" altLang="en-US" dirty="0" smtClean="0"/>
+              <a:t>とそのラベル</a:t>
             </a:r>
             <a:r>
               <a:rPr kumimoji="1" lang="en-US" altLang="ja-JP" dirty="0" smtClean="0"/>
@@ -4327,7 +4319,7 @@
             </a:r>
             <a:r>
               <a:rPr kumimoji="1" lang="en-US" altLang="ja-JP" dirty="0" smtClean="0"/>
-              <a:t>)</a:t>
+              <a:t>)y</a:t>
             </a:r>
             <a:r>
               <a:rPr kumimoji="1" lang="ja-JP" altLang="en-US" dirty="0" smtClean="0"/>
@@ -4346,16 +4338,12 @@
               <a:t>: </a:t>
             </a:r>
             <a:r>
-              <a:rPr kumimoji="1" lang="en-US" altLang="ja-JP" dirty="0" err="1" smtClean="0"/>
-              <a:t>φ</a:t>
-            </a:r>
-            <a:r>
-              <a:rPr kumimoji="1" lang="en-US" altLang="ja-JP" dirty="0"/>
-              <a:t>(</a:t>
+              <a:rPr kumimoji="1" lang="en-US" altLang="ja-JP" b="1" dirty="0"/>
+              <a:t>x</a:t>
             </a:r>
             <a:r>
               <a:rPr kumimoji="1" lang="en-US" altLang="ja-JP" dirty="0" smtClean="0"/>
-              <a:t>φ1,φ2,…φ9)</a:t>
+              <a:t>(x1,x2,…x9)</a:t>
             </a:r>
             <a:r>
               <a:rPr kumimoji="1" lang="ja-JP" altLang="en-US" dirty="0" smtClean="0"/>
@@ -4366,8 +4354,12 @@
           <a:p>
             <a:pPr lvl="2"/>
             <a:r>
+              <a:rPr kumimoji="1" lang="en-US" altLang="ja-JP" dirty="0"/>
+              <a:t>x</a:t>
+            </a:r>
+            <a:r>
               <a:rPr kumimoji="1" lang="en-US" altLang="ja-JP" dirty="0" smtClean="0"/>
-              <a:t>φ1 = </a:t>
+              <a:t>1 = </a:t>
             </a:r>
             <a:r>
               <a:rPr kumimoji="1" lang="ja-JP" altLang="en-US" dirty="0" smtClean="0"/>
@@ -4398,7 +4390,7 @@
             </a:br>
             <a:r>
               <a:rPr kumimoji="1" lang="en-US" altLang="ja-JP" dirty="0" smtClean="0"/>
-              <a:t>φ2 </a:t>
+              <a:t>x2 </a:t>
             </a:r>
             <a:r>
               <a:rPr kumimoji="1" lang="en-US" altLang="ja-JP" dirty="0"/>
@@ -4440,8 +4432,12 @@
               <a:rPr kumimoji="1" lang="en-US" altLang="ja-JP" dirty="0"/>
             </a:br>
             <a:r>
+              <a:rPr kumimoji="1" lang="en-US" altLang="ja-JP" dirty="0"/>
+              <a:t>x</a:t>
+            </a:r>
+            <a:r>
               <a:rPr kumimoji="1" lang="en-US" altLang="ja-JP" dirty="0" smtClean="0"/>
-              <a:t>φ3 </a:t>
+              <a:t>3 </a:t>
             </a:r>
             <a:r>
               <a:rPr kumimoji="1" lang="en-US" altLang="ja-JP" dirty="0"/>
@@ -4483,8 +4479,12 @@
               <a:rPr kumimoji="1" lang="en-US" altLang="ja-JP" dirty="0"/>
             </a:br>
             <a:r>
+              <a:rPr kumimoji="1" lang="en-US" altLang="ja-JP" dirty="0"/>
+              <a:t>x</a:t>
+            </a:r>
+            <a:r>
               <a:rPr kumimoji="1" lang="en-US" altLang="ja-JP" dirty="0" smtClean="0"/>
-              <a:t>φ4 </a:t>
+              <a:t>4 </a:t>
             </a:r>
             <a:r>
               <a:rPr kumimoji="1" lang="en-US" altLang="ja-JP" dirty="0"/>
@@ -4522,8 +4522,12 @@
               <a:rPr kumimoji="1" lang="en-US" altLang="ja-JP" dirty="0"/>
             </a:br>
             <a:r>
+              <a:rPr kumimoji="1" lang="en-US" altLang="ja-JP" dirty="0"/>
+              <a:t>x</a:t>
+            </a:r>
+            <a:r>
               <a:rPr kumimoji="1" lang="en-US" altLang="ja-JP" dirty="0" smtClean="0"/>
-              <a:t>φ5 </a:t>
+              <a:t>5 </a:t>
             </a:r>
             <a:r>
               <a:rPr kumimoji="1" lang="en-US" altLang="ja-JP" dirty="0"/>
@@ -4565,8 +4569,12 @@
               <a:rPr kumimoji="1" lang="en-US" altLang="ja-JP" dirty="0"/>
             </a:br>
             <a:r>
+              <a:rPr kumimoji="1" lang="en-US" altLang="ja-JP" dirty="0"/>
+              <a:t>x</a:t>
+            </a:r>
+            <a:r>
               <a:rPr kumimoji="1" lang="en-US" altLang="ja-JP" dirty="0" smtClean="0"/>
-              <a:t>φ6 </a:t>
+              <a:t>6 </a:t>
             </a:r>
             <a:r>
               <a:rPr kumimoji="1" lang="en-US" altLang="ja-JP" dirty="0"/>
@@ -4608,8 +4616,12 @@
               <a:rPr kumimoji="1" lang="en-US" altLang="ja-JP" dirty="0"/>
             </a:br>
             <a:r>
+              <a:rPr kumimoji="1" lang="en-US" altLang="ja-JP" dirty="0"/>
+              <a:t>x</a:t>
+            </a:r>
+            <a:r>
               <a:rPr kumimoji="1" lang="en-US" altLang="ja-JP" dirty="0" smtClean="0"/>
-              <a:t>φ7 </a:t>
+              <a:t>7 </a:t>
             </a:r>
             <a:r>
               <a:rPr kumimoji="1" lang="en-US" altLang="ja-JP" dirty="0"/>
@@ -4647,8 +4659,12 @@
               <a:rPr kumimoji="1" lang="en-US" altLang="ja-JP" dirty="0"/>
             </a:br>
             <a:r>
+              <a:rPr kumimoji="1" lang="en-US" altLang="ja-JP" dirty="0"/>
+              <a:t>x</a:t>
+            </a:r>
+            <a:r>
               <a:rPr kumimoji="1" lang="en-US" altLang="ja-JP" dirty="0" smtClean="0"/>
-              <a:t>φ8 </a:t>
+              <a:t>8 </a:t>
             </a:r>
             <a:r>
               <a:rPr kumimoji="1" lang="en-US" altLang="ja-JP" dirty="0"/>
@@ -4690,8 +4706,12 @@
               <a:rPr kumimoji="1" lang="en-US" altLang="ja-JP" dirty="0"/>
             </a:br>
             <a:r>
+              <a:rPr kumimoji="1" lang="en-US" altLang="ja-JP" dirty="0"/>
+              <a:t>x</a:t>
+            </a:r>
+            <a:r>
               <a:rPr kumimoji="1" lang="en-US" altLang="ja-JP" dirty="0" smtClean="0"/>
-              <a:t>φ9 </a:t>
+              <a:t>9 </a:t>
             </a:r>
             <a:r>
               <a:rPr kumimoji="1" lang="en-US" altLang="ja-JP" dirty="0"/>
@@ -4739,7 +4759,7 @@
             </a:r>
             <a:r>
               <a:rPr kumimoji="1" lang="en-US" altLang="ja-JP" dirty="0" smtClean="0"/>
-              <a:t> = (1,0,1,0,0,0,0,1,0), label: N</a:t>
+              <a:t> = (1,0,1,0,0,0,0,1,0), label y: N</a:t>
             </a:r>
             <a:r>
               <a:rPr kumimoji="1" lang="ja-JP" altLang="en-US" dirty="0" err="1" smtClean="0"/>
@@ -4774,7 +4794,15 @@
             </a:r>
             <a:r>
               <a:rPr kumimoji="1" lang="en-US" altLang="ja-JP" dirty="0"/>
-              <a:t>), label: N</a:t>
+              <a:t>), </a:t>
+            </a:r>
+            <a:r>
+              <a:rPr kumimoji="1" lang="en-US" altLang="ja-JP" dirty="0" smtClean="0"/>
+              <a:t>label y: </a:t>
+            </a:r>
+            <a:r>
+              <a:rPr kumimoji="1" lang="en-US" altLang="ja-JP" dirty="0"/>
+              <a:t>N</a:t>
             </a:r>
             <a:r>
               <a:rPr kumimoji="1" lang="ja-JP" altLang="en-US" dirty="0" err="1" smtClean="0"/>
@@ -4901,11 +4929,7 @@
           <a:p>
             <a:r>
               <a:rPr kumimoji="1" lang="ja-JP" altLang="en-US" dirty="0" smtClean="0"/>
-              <a:t>最大</a:t>
-            </a:r>
-            <a:r>
-              <a:rPr kumimoji="1" lang="ja-JP" altLang="en-US" dirty="0" smtClean="0"/>
-              <a:t>エントロピー法：分類・まとめ</a:t>
+              <a:t>最大エントロピー法：分類・まとめ</a:t>
             </a:r>
             <a:endParaRPr kumimoji="1" lang="ja-JP" altLang="en-US" dirty="0"/>
           </a:p>
@@ -6809,14 +6833,6 @@
               </a:rPr>
               <a:t>words = [“The”, “cat”, “is”, …]</a:t>
             </a:r>
-            <a:r>
-              <a:rPr lang="en-US" altLang="ja-JP" sz="2400" dirty="0">
-                <a:latin typeface="Consolas" pitchFamily="49" charset="0"/>
-                <a:cs typeface="Consolas" pitchFamily="49" charset="0"/>
-                <a:sym typeface="Helvetica" charset="0"/>
-              </a:rPr>
-              <a:t/>
-            </a:r>
             <a:br>
               <a:rPr lang="en-US" altLang="ja-JP" sz="2400" dirty="0">
                 <a:latin typeface="Consolas" pitchFamily="49" charset="0"/>
@@ -7027,15 +7043,7 @@
             <a:pPr lvl="1"/>
             <a:r>
               <a:rPr kumimoji="1" lang="ja-JP" altLang="en-US" dirty="0" smtClean="0"/>
-              <a:t>テストデータが学習データに含まれる</a:t>
-            </a:r>
-            <a:r>
-              <a:rPr kumimoji="1" lang="ja-JP" altLang="en-US" dirty="0" smtClean="0"/>
-              <a:t>と何がまずい</a:t>
-            </a:r>
-            <a:r>
-              <a:rPr kumimoji="1" lang="ja-JP" altLang="en-US" dirty="0" smtClean="0"/>
-              <a:t>？</a:t>
+              <a:t>テストデータが学習データに含まれると何がまずい？</a:t>
             </a:r>
             <a:endParaRPr kumimoji="1" lang="en-US" altLang="ja-JP" dirty="0" smtClean="0"/>
           </a:p>
@@ -7073,23 +7081,7 @@
             </a:br>
             <a:r>
               <a:rPr kumimoji="1" lang="en-US" altLang="ja-JP" dirty="0" smtClean="0"/>
-              <a:t>(num. of correct </a:t>
-            </a:r>
-            <a:r>
-              <a:rPr kumimoji="1" lang="en-US" altLang="ja-JP" dirty="0" smtClean="0"/>
-              <a:t>output) </a:t>
-            </a:r>
-            <a:r>
-              <a:rPr kumimoji="1" lang="en-US" altLang="ja-JP" dirty="0" smtClean="0"/>
-              <a:t>/ (num. of input </a:t>
-            </a:r>
-            <a:r>
-              <a:rPr kumimoji="1" lang="en-US" altLang="ja-JP" dirty="0" smtClean="0"/>
-              <a:t>instances</a:t>
-            </a:r>
-            <a:r>
-              <a:rPr kumimoji="1" lang="en-US" altLang="ja-JP" dirty="0" smtClean="0"/>
-              <a:t>)</a:t>
+              <a:t>(num. of correct output) / (num. of input instances)</a:t>
             </a:r>
             <a:endParaRPr kumimoji="1" lang="en-US" altLang="ja-JP" dirty="0"/>
           </a:p>
@@ -8555,11 +8547,7 @@
             </a:r>
             <a:r>
               <a:rPr lang="ja-JP" altLang="en-US" dirty="0" smtClean="0"/>
-              <a:t>そして</a:t>
-            </a:r>
-            <a:r>
-              <a:rPr lang="ja-JP" altLang="en-US" dirty="0" smtClean="0"/>
-              <a:t>考える</a:t>
+              <a:t>そして考える</a:t>
             </a:r>
             <a:endParaRPr lang="en-US" altLang="ja-JP" dirty="0" smtClean="0"/>
           </a:p>
@@ -8585,11 +8573,7 @@
             </a:pPr>
             <a:r>
               <a:rPr lang="ja-JP" altLang="en-US" dirty="0" smtClean="0"/>
-              <a:t>より広い範囲の構文的な情報を取り込むとどうなるだろう</a:t>
-            </a:r>
-            <a:r>
-              <a:rPr lang="ja-JP" altLang="en-US" dirty="0" smtClean="0"/>
-              <a:t>か</a:t>
+              <a:t>より広い範囲の構文的な情報を取り込むとどうなるだろうか</a:t>
             </a:r>
             <a:endParaRPr lang="en-US" altLang="ja-JP" dirty="0" smtClean="0"/>
           </a:p>

</xml_diff>